<commit_message>
Controlling Database Creation and Schema.
</commit_message>
<xml_diff>
--- a/Presentation/AzurePostgreSQl.pptx
+++ b/Presentation/AzurePostgreSQl.pptx
@@ -5,7 +5,7 @@
     <p:sldMasterId id="2147483712" r:id="rId4"/>
   </p:sldMasterIdLst>
   <p:notesMasterIdLst>
-    <p:notesMasterId r:id="rId14"/>
+    <p:notesMasterId r:id="rId24"/>
   </p:notesMasterIdLst>
   <p:sldIdLst>
     <p:sldId id="257" r:id="rId5"/>
@@ -17,6 +17,16 @@
     <p:sldId id="304" r:id="rId11"/>
     <p:sldId id="305" r:id="rId12"/>
     <p:sldId id="306" r:id="rId13"/>
+    <p:sldId id="310" r:id="rId14"/>
+    <p:sldId id="308" r:id="rId15"/>
+    <p:sldId id="309" r:id="rId16"/>
+    <p:sldId id="311" r:id="rId17"/>
+    <p:sldId id="312" r:id="rId18"/>
+    <p:sldId id="313" r:id="rId19"/>
+    <p:sldId id="314" r:id="rId20"/>
+    <p:sldId id="315" r:id="rId21"/>
+    <p:sldId id="316" r:id="rId22"/>
+    <p:sldId id="317" r:id="rId23"/>
   </p:sldIdLst>
   <p:sldSz cx="12192000" cy="6858000"/>
   <p:notesSz cx="6858000" cy="9144000"/>
@@ -205,7 +215,7 @@
           <a:p>
             <a:fld id="{C5935FA4-E1A2-4535-94CE-D42A248BB67A}" type="datetimeFigureOut">
               <a:rPr lang="en-US" smtClean="0"/>
-              <a:t>3/30/2021</a:t>
+              <a:t>4/2/2021</a:t>
             </a:fld>
             <a:endParaRPr lang="en-US"/>
           </a:p>
@@ -710,7 +720,7 @@
           <a:p>
             <a:fld id="{ED291B17-9318-49DB-B28B-6E5994AE9581}" type="datetime1">
               <a:rPr lang="en-US" smtClean="0"/>
-              <a:t>3/30/2021</a:t>
+              <a:t>4/2/2021</a:t>
             </a:fld>
             <a:endParaRPr lang="en-US" dirty="0"/>
           </a:p>
@@ -913,7 +923,7 @@
           <a:p>
             <a:fld id="{2CED4963-E985-44C4-B8C4-FDD613B7C2F8}" type="datetime1">
               <a:rPr lang="en-US" smtClean="0"/>
-              <a:t>3/30/2021</a:t>
+              <a:t>4/2/2021</a:t>
             </a:fld>
             <a:endParaRPr lang="en-US" dirty="0"/>
           </a:p>
@@ -1275,7 +1285,7 @@
           <a:p>
             <a:fld id="{ED291B17-9318-49DB-B28B-6E5994AE9581}" type="datetime1">
               <a:rPr lang="en-US" smtClean="0"/>
-              <a:t>3/30/2021</a:t>
+              <a:t>4/2/2021</a:t>
             </a:fld>
             <a:endParaRPr lang="en-US" dirty="0"/>
           </a:p>
@@ -1473,7 +1483,7 @@
           <a:p>
             <a:fld id="{78DD82B9-B8EE-4375-B6FF-88FA6ABB15D9}" type="datetime1">
               <a:rPr lang="en-US" smtClean="0"/>
-              <a:t>3/30/2021</a:t>
+              <a:t>4/2/2021</a:t>
             </a:fld>
             <a:endParaRPr lang="en-US" dirty="0"/>
           </a:p>
@@ -1785,7 +1795,7 @@
           <a:p>
             <a:fld id="{B2497495-0637-405E-AE64-5CC7506D51F5}" type="datetime1">
               <a:rPr lang="en-US" smtClean="0"/>
-              <a:t>3/30/2021</a:t>
+              <a:t>4/2/2021</a:t>
             </a:fld>
             <a:endParaRPr lang="en-US" dirty="0"/>
           </a:p>
@@ -2038,7 +2048,7 @@
           <a:p>
             <a:fld id="{7BFFD690-9426-415D-8B65-26881E07B2D4}" type="datetime1">
               <a:rPr lang="en-US" smtClean="0"/>
-              <a:t>3/30/2021</a:t>
+              <a:t>4/2/2021</a:t>
             </a:fld>
             <a:endParaRPr lang="en-US" dirty="0"/>
           </a:p>
@@ -2460,7 +2470,7 @@
           <a:p>
             <a:fld id="{04C4989A-474C-40DE-95B9-011C28B71673}" type="datetime1">
               <a:rPr lang="en-US" smtClean="0"/>
-              <a:t>3/30/2021</a:t>
+              <a:t>4/2/2021</a:t>
             </a:fld>
             <a:endParaRPr lang="en-US" dirty="0"/>
           </a:p>
@@ -2583,7 +2593,7 @@
           <a:p>
             <a:fld id="{5DB4ED54-5B5E-4A04-93D3-5772E3CE3818}" type="datetime1">
               <a:rPr lang="en-US" smtClean="0"/>
-              <a:t>3/30/2021</a:t>
+              <a:t>4/2/2021</a:t>
             </a:fld>
             <a:endParaRPr lang="en-US" dirty="0"/>
           </a:p>
@@ -2678,7 +2688,7 @@
           <a:p>
             <a:fld id="{4EDE50D6-574B-40AF-946F-D52A04ADE379}" type="datetime1">
               <a:rPr lang="en-US" smtClean="0"/>
-              <a:t>3/30/2021</a:t>
+              <a:t>4/2/2021</a:t>
             </a:fld>
             <a:endParaRPr lang="en-US" dirty="0"/>
           </a:p>
@@ -3055,7 +3065,7 @@
           <a:p>
             <a:fld id="{D82884F1-FFEA-405F-9602-3DCA865EDA4E}" type="datetime1">
               <a:rPr lang="en-US" smtClean="0"/>
-              <a:t>3/30/2021</a:t>
+              <a:t>4/2/2021</a:t>
             </a:fld>
             <a:endParaRPr lang="en-US" dirty="0"/>
           </a:p>
@@ -3348,7 +3358,7 @@
           <a:p>
             <a:fld id="{7E18DB4A-8810-4A10-AD5C-D5E2C667F5B3}" type="datetime1">
               <a:rPr lang="en-US" smtClean="0"/>
-              <a:t>3/30/2021</a:t>
+              <a:t>4/2/2021</a:t>
             </a:fld>
             <a:endParaRPr lang="en-US" dirty="0"/>
           </a:p>
@@ -3563,7 +3573,7 @@
           <a:p>
             <a:fld id="{ED291B17-9318-49DB-B28B-6E5994AE9581}" type="datetime1">
               <a:rPr lang="en-US" smtClean="0"/>
-              <a:t>3/30/2021</a:t>
+              <a:t>4/2/2021</a:t>
             </a:fld>
             <a:endParaRPr lang="en-US" dirty="0"/>
           </a:p>
@@ -4531,6 +4541,1725 @@
     <p:extLst>
       <p:ext uri="{BB962C8B-B14F-4D97-AF65-F5344CB8AC3E}">
         <p14:creationId xmlns:p14="http://schemas.microsoft.com/office/powerpoint/2010/main" val="2475805559"/>
+      </p:ext>
+    </p:extLst>
+  </p:cSld>
+  <p:clrMapOvr>
+    <a:masterClrMapping/>
+  </p:clrMapOvr>
+</p:sld>
+</file>
+
+<file path=ppt/slides/slide10.xml><?xml version="1.0" encoding="utf-8"?>
+<p:sld xmlns:a="http://schemas.openxmlformats.org/drawingml/2006/main" xmlns:r="http://schemas.openxmlformats.org/officeDocument/2006/relationships" xmlns:p="http://schemas.openxmlformats.org/presentationml/2006/main">
+  <p:cSld>
+    <p:spTree>
+      <p:nvGrpSpPr>
+        <p:cNvPr id="1" name=""/>
+        <p:cNvGrpSpPr/>
+        <p:nvPr/>
+      </p:nvGrpSpPr>
+      <p:grpSpPr>
+        <a:xfrm>
+          <a:off x="0" y="0"/>
+          <a:ext cx="0" cy="0"/>
+          <a:chOff x="0" y="0"/>
+          <a:chExt cx="0" cy="0"/>
+        </a:xfrm>
+      </p:grpSpPr>
+      <p:sp>
+        <p:nvSpPr>
+          <p:cNvPr id="2" name="Title 1">
+            <a:extLst>
+              <a:ext uri="{FF2B5EF4-FFF2-40B4-BE49-F238E27FC236}">
+                <a16:creationId xmlns:a16="http://schemas.microsoft.com/office/drawing/2014/main" id="{CF606B99-F902-478D-8B46-F72F789A6636}"/>
+              </a:ext>
+            </a:extLst>
+          </p:cNvPr>
+          <p:cNvSpPr>
+            <a:spLocks noGrp="1"/>
+          </p:cNvSpPr>
+          <p:nvPr>
+            <p:ph type="title"/>
+          </p:nvPr>
+        </p:nvSpPr>
+        <p:spPr>
+          <a:xfrm>
+            <a:off x="581192" y="702156"/>
+            <a:ext cx="11029616" cy="581360"/>
+          </a:xfrm>
+        </p:spPr>
+        <p:txBody>
+          <a:bodyPr/>
+          <a:lstStyle/>
+          <a:p>
+            <a:r>
+              <a:rPr lang="en-US" dirty="0"/>
+              <a:t>NPGSQL and </a:t>
+            </a:r>
+            <a:r>
+              <a:rPr lang="en-US" dirty="0" err="1"/>
+              <a:t>Microsoft.ENTITYFRAMEWORKCORE.TOOLS</a:t>
+            </a:r>
+            <a:endParaRPr lang="en-US" dirty="0"/>
+          </a:p>
+        </p:txBody>
+      </p:sp>
+      <p:pic>
+        <p:nvPicPr>
+          <p:cNvPr id="4" name="Picture 3">
+            <a:extLst>
+              <a:ext uri="{FF2B5EF4-FFF2-40B4-BE49-F238E27FC236}">
+                <a16:creationId xmlns:a16="http://schemas.microsoft.com/office/drawing/2014/main" id="{4A45D5A3-8690-46F6-90D2-CFC817C9CBD2}"/>
+              </a:ext>
+            </a:extLst>
+          </p:cNvPr>
+          <p:cNvPicPr>
+            <a:picLocks noChangeAspect="1"/>
+          </p:cNvPicPr>
+          <p:nvPr/>
+        </p:nvPicPr>
+        <p:blipFill>
+          <a:blip r:embed="rId2"/>
+          <a:stretch>
+            <a:fillRect/>
+          </a:stretch>
+        </p:blipFill>
+        <p:spPr>
+          <a:xfrm>
+            <a:off x="343948" y="1866138"/>
+            <a:ext cx="8486775" cy="1238250"/>
+          </a:xfrm>
+          <a:prstGeom prst="rect">
+            <a:avLst/>
+          </a:prstGeom>
+        </p:spPr>
+      </p:pic>
+      <p:sp>
+        <p:nvSpPr>
+          <p:cNvPr id="5" name="TextBox 4">
+            <a:extLst>
+              <a:ext uri="{FF2B5EF4-FFF2-40B4-BE49-F238E27FC236}">
+                <a16:creationId xmlns:a16="http://schemas.microsoft.com/office/drawing/2014/main" id="{D6B5F6E5-ADFD-4483-BAC9-ACAACDCB4065}"/>
+              </a:ext>
+            </a:extLst>
+          </p:cNvPr>
+          <p:cNvSpPr txBox="1"/>
+          <p:nvPr/>
+        </p:nvSpPr>
+        <p:spPr>
+          <a:xfrm>
+            <a:off x="427838" y="1390161"/>
+            <a:ext cx="3074368" cy="369332"/>
+          </a:xfrm>
+          <a:prstGeom prst="rect">
+            <a:avLst/>
+          </a:prstGeom>
+          <a:noFill/>
+        </p:spPr>
+        <p:txBody>
+          <a:bodyPr wrap="none" rtlCol="0">
+            <a:spAutoFit/>
+          </a:bodyPr>
+          <a:lstStyle/>
+          <a:p>
+            <a:r>
+              <a:rPr lang="en-US" dirty="0"/>
+              <a:t>The version should be same.</a:t>
+            </a:r>
+          </a:p>
+        </p:txBody>
+      </p:sp>
+    </p:spTree>
+    <p:extLst>
+      <p:ext uri="{BB962C8B-B14F-4D97-AF65-F5344CB8AC3E}">
+        <p14:creationId xmlns:p14="http://schemas.microsoft.com/office/powerpoint/2010/main" val="1298058856"/>
+      </p:ext>
+    </p:extLst>
+  </p:cSld>
+  <p:clrMapOvr>
+    <a:masterClrMapping/>
+  </p:clrMapOvr>
+</p:sld>
+</file>
+
+<file path=ppt/slides/slide11.xml><?xml version="1.0" encoding="utf-8"?>
+<p:sld xmlns:a="http://schemas.openxmlformats.org/drawingml/2006/main" xmlns:r="http://schemas.openxmlformats.org/officeDocument/2006/relationships" xmlns:p="http://schemas.openxmlformats.org/presentationml/2006/main">
+  <p:cSld>
+    <p:spTree>
+      <p:nvGrpSpPr>
+        <p:cNvPr id="1" name=""/>
+        <p:cNvGrpSpPr/>
+        <p:nvPr/>
+      </p:nvGrpSpPr>
+      <p:grpSpPr>
+        <a:xfrm>
+          <a:off x="0" y="0"/>
+          <a:ext cx="0" cy="0"/>
+          <a:chOff x="0" y="0"/>
+          <a:chExt cx="0" cy="0"/>
+        </a:xfrm>
+      </p:grpSpPr>
+      <p:sp>
+        <p:nvSpPr>
+          <p:cNvPr id="2" name="Title 1">
+            <a:extLst>
+              <a:ext uri="{FF2B5EF4-FFF2-40B4-BE49-F238E27FC236}">
+                <a16:creationId xmlns:a16="http://schemas.microsoft.com/office/drawing/2014/main" id="{4484AE7A-4B3C-4305-ADB9-1FCCFCEC4851}"/>
+              </a:ext>
+            </a:extLst>
+          </p:cNvPr>
+          <p:cNvSpPr>
+            <a:spLocks noGrp="1"/>
+          </p:cNvSpPr>
+          <p:nvPr>
+            <p:ph type="title"/>
+          </p:nvPr>
+        </p:nvSpPr>
+        <p:spPr>
+          <a:xfrm>
+            <a:off x="581192" y="702156"/>
+            <a:ext cx="11029616" cy="612294"/>
+          </a:xfrm>
+        </p:spPr>
+        <p:txBody>
+          <a:bodyPr>
+            <a:normAutofit/>
+          </a:bodyPr>
+          <a:lstStyle/>
+          <a:p>
+            <a:r>
+              <a:rPr lang="en-US" dirty="0"/>
+              <a:t>Entity framework </a:t>
+            </a:r>
+          </a:p>
+        </p:txBody>
+      </p:sp>
+      <p:pic>
+        <p:nvPicPr>
+          <p:cNvPr id="4" name="Picture 3">
+            <a:extLst>
+              <a:ext uri="{FF2B5EF4-FFF2-40B4-BE49-F238E27FC236}">
+                <a16:creationId xmlns:a16="http://schemas.microsoft.com/office/drawing/2014/main" id="{30357553-0013-479C-A585-C0C0BE1E5D1E}"/>
+              </a:ext>
+            </a:extLst>
+          </p:cNvPr>
+          <p:cNvPicPr>
+            <a:picLocks noChangeAspect="1"/>
+          </p:cNvPicPr>
+          <p:nvPr/>
+        </p:nvPicPr>
+        <p:blipFill>
+          <a:blip r:embed="rId2"/>
+          <a:stretch>
+            <a:fillRect/>
+          </a:stretch>
+        </p:blipFill>
+        <p:spPr>
+          <a:xfrm>
+            <a:off x="130916" y="1614356"/>
+            <a:ext cx="7159167" cy="4572000"/>
+          </a:xfrm>
+          <a:prstGeom prst="rect">
+            <a:avLst/>
+          </a:prstGeom>
+        </p:spPr>
+      </p:pic>
+      <p:sp>
+        <p:nvSpPr>
+          <p:cNvPr id="3" name="TextBox 2">
+            <a:extLst>
+              <a:ext uri="{FF2B5EF4-FFF2-40B4-BE49-F238E27FC236}">
+                <a16:creationId xmlns:a16="http://schemas.microsoft.com/office/drawing/2014/main" id="{95ADBCF6-57A8-4CDD-A680-AF589DE602F1}"/>
+              </a:ext>
+            </a:extLst>
+          </p:cNvPr>
+          <p:cNvSpPr txBox="1"/>
+          <p:nvPr/>
+        </p:nvSpPr>
+        <p:spPr>
+          <a:xfrm>
+            <a:off x="130916" y="1289066"/>
+            <a:ext cx="4901919" cy="369332"/>
+          </a:xfrm>
+          <a:prstGeom prst="rect">
+            <a:avLst/>
+          </a:prstGeom>
+          <a:noFill/>
+        </p:spPr>
+        <p:txBody>
+          <a:bodyPr wrap="none" rtlCol="0">
+            <a:spAutoFit/>
+          </a:bodyPr>
+          <a:lstStyle/>
+          <a:p>
+            <a:r>
+              <a:rPr lang="en-US" dirty="0"/>
+              <a:t>Get-Migration is new to Entity Framework Core 5.</a:t>
+            </a:r>
+          </a:p>
+        </p:txBody>
+      </p:sp>
+    </p:spTree>
+    <p:extLst>
+      <p:ext uri="{BB962C8B-B14F-4D97-AF65-F5344CB8AC3E}">
+        <p14:creationId xmlns:p14="http://schemas.microsoft.com/office/powerpoint/2010/main" val="2865040629"/>
+      </p:ext>
+    </p:extLst>
+  </p:cSld>
+  <p:clrMapOvr>
+    <a:masterClrMapping/>
+  </p:clrMapOvr>
+</p:sld>
+</file>
+
+<file path=ppt/slides/slide12.xml><?xml version="1.0" encoding="utf-8"?>
+<p:sld xmlns:a="http://schemas.openxmlformats.org/drawingml/2006/main" xmlns:r="http://schemas.openxmlformats.org/officeDocument/2006/relationships" xmlns:p="http://schemas.openxmlformats.org/presentationml/2006/main">
+  <p:cSld>
+    <p:spTree>
+      <p:nvGrpSpPr>
+        <p:cNvPr id="1" name=""/>
+        <p:cNvGrpSpPr/>
+        <p:nvPr/>
+      </p:nvGrpSpPr>
+      <p:grpSpPr>
+        <a:xfrm>
+          <a:off x="0" y="0"/>
+          <a:ext cx="0" cy="0"/>
+          <a:chOff x="0" y="0"/>
+          <a:chExt cx="0" cy="0"/>
+        </a:xfrm>
+      </p:grpSpPr>
+      <p:sp>
+        <p:nvSpPr>
+          <p:cNvPr id="2" name="Title 1">
+            <a:extLst>
+              <a:ext uri="{FF2B5EF4-FFF2-40B4-BE49-F238E27FC236}">
+                <a16:creationId xmlns:a16="http://schemas.microsoft.com/office/drawing/2014/main" id="{14EF7B26-C6A7-45C2-9CF3-D8EC6D697C49}"/>
+              </a:ext>
+            </a:extLst>
+          </p:cNvPr>
+          <p:cNvSpPr>
+            <a:spLocks noGrp="1"/>
+          </p:cNvSpPr>
+          <p:nvPr>
+            <p:ph type="title"/>
+          </p:nvPr>
+        </p:nvSpPr>
+        <p:spPr>
+          <a:xfrm>
+            <a:off x="581192" y="702156"/>
+            <a:ext cx="11029616" cy="531026"/>
+          </a:xfrm>
+        </p:spPr>
+        <p:txBody>
+          <a:bodyPr/>
+          <a:lstStyle/>
+          <a:p>
+            <a:r>
+              <a:rPr lang="en-US" dirty="0"/>
+              <a:t>Entity framework – Migrations - 1 </a:t>
+            </a:r>
+          </a:p>
+        </p:txBody>
+      </p:sp>
+      <p:pic>
+        <p:nvPicPr>
+          <p:cNvPr id="4" name="Picture 3">
+            <a:extLst>
+              <a:ext uri="{FF2B5EF4-FFF2-40B4-BE49-F238E27FC236}">
+                <a16:creationId xmlns:a16="http://schemas.microsoft.com/office/drawing/2014/main" id="{3C70A724-13D7-4BEB-B13E-D87EE50BD331}"/>
+              </a:ext>
+            </a:extLst>
+          </p:cNvPr>
+          <p:cNvPicPr>
+            <a:picLocks noChangeAspect="1"/>
+          </p:cNvPicPr>
+          <p:nvPr/>
+        </p:nvPicPr>
+        <p:blipFill>
+          <a:blip r:embed="rId2"/>
+          <a:stretch>
+            <a:fillRect/>
+          </a:stretch>
+        </p:blipFill>
+        <p:spPr>
+          <a:xfrm>
+            <a:off x="276837" y="1618494"/>
+            <a:ext cx="6800850" cy="1228725"/>
+          </a:xfrm>
+          <a:prstGeom prst="rect">
+            <a:avLst/>
+          </a:prstGeom>
+        </p:spPr>
+      </p:pic>
+      <p:sp>
+        <p:nvSpPr>
+          <p:cNvPr id="6" name="TextBox 5">
+            <a:extLst>
+              <a:ext uri="{FF2B5EF4-FFF2-40B4-BE49-F238E27FC236}">
+                <a16:creationId xmlns:a16="http://schemas.microsoft.com/office/drawing/2014/main" id="{F0757538-8F3F-44B0-ACBA-7E8E1520BAEA}"/>
+              </a:ext>
+            </a:extLst>
+          </p:cNvPr>
+          <p:cNvSpPr txBox="1"/>
+          <p:nvPr/>
+        </p:nvSpPr>
+        <p:spPr>
+          <a:xfrm>
+            <a:off x="151002" y="1238614"/>
+            <a:ext cx="10272427" cy="369332"/>
+          </a:xfrm>
+          <a:prstGeom prst="rect">
+            <a:avLst/>
+          </a:prstGeom>
+          <a:noFill/>
+        </p:spPr>
+        <p:txBody>
+          <a:bodyPr wrap="none" rtlCol="0">
+            <a:spAutoFit/>
+          </a:bodyPr>
+          <a:lstStyle/>
+          <a:p>
+            <a:r>
+              <a:rPr lang="en-US" dirty="0"/>
+              <a:t>Data library project targets </a:t>
+            </a:r>
+            <a:r>
+              <a:rPr lang="en-US" dirty="0" err="1"/>
+              <a:t>.Net</a:t>
+            </a:r>
+            <a:r>
+              <a:rPr lang="en-US" dirty="0"/>
+              <a:t> 5, so can run migrations, unlike earlier libraries targeting .NET standard.</a:t>
+            </a:r>
+          </a:p>
+        </p:txBody>
+      </p:sp>
+      <p:pic>
+        <p:nvPicPr>
+          <p:cNvPr id="7" name="Picture 6">
+            <a:extLst>
+              <a:ext uri="{FF2B5EF4-FFF2-40B4-BE49-F238E27FC236}">
+                <a16:creationId xmlns:a16="http://schemas.microsoft.com/office/drawing/2014/main" id="{E4F52196-C495-4D3E-BDF2-3EE7870E7434}"/>
+              </a:ext>
+            </a:extLst>
+          </p:cNvPr>
+          <p:cNvPicPr>
+            <a:picLocks noChangeAspect="1"/>
+          </p:cNvPicPr>
+          <p:nvPr/>
+        </p:nvPicPr>
+        <p:blipFill>
+          <a:blip r:embed="rId3"/>
+          <a:stretch>
+            <a:fillRect/>
+          </a:stretch>
+        </p:blipFill>
+        <p:spPr>
+          <a:xfrm>
+            <a:off x="151002" y="3376569"/>
+            <a:ext cx="3276600" cy="723900"/>
+          </a:xfrm>
+          <a:prstGeom prst="rect">
+            <a:avLst/>
+          </a:prstGeom>
+        </p:spPr>
+      </p:pic>
+      <p:sp>
+        <p:nvSpPr>
+          <p:cNvPr id="9" name="TextBox 8">
+            <a:extLst>
+              <a:ext uri="{FF2B5EF4-FFF2-40B4-BE49-F238E27FC236}">
+                <a16:creationId xmlns:a16="http://schemas.microsoft.com/office/drawing/2014/main" id="{4D63E128-543F-4714-84E6-90BE600AA91C}"/>
+              </a:ext>
+            </a:extLst>
+          </p:cNvPr>
+          <p:cNvSpPr txBox="1"/>
+          <p:nvPr/>
+        </p:nvSpPr>
+        <p:spPr>
+          <a:xfrm>
+            <a:off x="0" y="3007237"/>
+            <a:ext cx="8165120" cy="369332"/>
+          </a:xfrm>
+          <a:prstGeom prst="rect">
+            <a:avLst/>
+          </a:prstGeom>
+          <a:noFill/>
+        </p:spPr>
+        <p:txBody>
+          <a:bodyPr wrap="none" rtlCol="0">
+            <a:spAutoFit/>
+          </a:bodyPr>
+          <a:lstStyle/>
+          <a:p>
+            <a:r>
+              <a:rPr lang="en-US" dirty="0"/>
+              <a:t>The snapshot is used to determine how to migrate from one model version to next.</a:t>
+            </a:r>
+          </a:p>
+        </p:txBody>
+      </p:sp>
+      <p:pic>
+        <p:nvPicPr>
+          <p:cNvPr id="11" name="Picture 10">
+            <a:extLst>
+              <a:ext uri="{FF2B5EF4-FFF2-40B4-BE49-F238E27FC236}">
+                <a16:creationId xmlns:a16="http://schemas.microsoft.com/office/drawing/2014/main" id="{29D79237-7030-46AA-8CF2-F3F89527B0B1}"/>
+              </a:ext>
+            </a:extLst>
+          </p:cNvPr>
+          <p:cNvPicPr>
+            <a:picLocks noChangeAspect="1"/>
+          </p:cNvPicPr>
+          <p:nvPr/>
+        </p:nvPicPr>
+        <p:blipFill>
+          <a:blip r:embed="rId4"/>
+          <a:stretch>
+            <a:fillRect/>
+          </a:stretch>
+        </p:blipFill>
+        <p:spPr>
+          <a:xfrm>
+            <a:off x="66980" y="4524011"/>
+            <a:ext cx="11420475" cy="2190750"/>
+          </a:xfrm>
+          <a:prstGeom prst="rect">
+            <a:avLst/>
+          </a:prstGeom>
+        </p:spPr>
+      </p:pic>
+      <p:sp>
+        <p:nvSpPr>
+          <p:cNvPr id="12" name="TextBox 11">
+            <a:extLst>
+              <a:ext uri="{FF2B5EF4-FFF2-40B4-BE49-F238E27FC236}">
+                <a16:creationId xmlns:a16="http://schemas.microsoft.com/office/drawing/2014/main" id="{31539808-710E-4CBA-A373-EF7C6CB9C1E8}"/>
+              </a:ext>
+            </a:extLst>
+          </p:cNvPr>
+          <p:cNvSpPr txBox="1"/>
+          <p:nvPr/>
+        </p:nvSpPr>
+        <p:spPr>
+          <a:xfrm>
+            <a:off x="66980" y="4154679"/>
+            <a:ext cx="2252733" cy="369332"/>
+          </a:xfrm>
+          <a:prstGeom prst="rect">
+            <a:avLst/>
+          </a:prstGeom>
+          <a:noFill/>
+        </p:spPr>
+        <p:txBody>
+          <a:bodyPr wrap="none" rtlCol="0">
+            <a:spAutoFit/>
+          </a:bodyPr>
+          <a:lstStyle/>
+          <a:p>
+            <a:r>
+              <a:rPr lang="en-US" dirty="0"/>
+              <a:t>Set to </a:t>
+            </a:r>
+            <a:r>
+              <a:rPr lang="en-US" dirty="0" err="1"/>
+              <a:t>Npgsql</a:t>
+            </a:r>
+            <a:r>
+              <a:rPr lang="en-US" dirty="0"/>
+              <a:t> identity</a:t>
+            </a:r>
+          </a:p>
+        </p:txBody>
+      </p:sp>
+    </p:spTree>
+    <p:extLst>
+      <p:ext uri="{BB962C8B-B14F-4D97-AF65-F5344CB8AC3E}">
+        <p14:creationId xmlns:p14="http://schemas.microsoft.com/office/powerpoint/2010/main" val="4071777829"/>
+      </p:ext>
+    </p:extLst>
+  </p:cSld>
+  <p:clrMapOvr>
+    <a:masterClrMapping/>
+  </p:clrMapOvr>
+</p:sld>
+</file>
+
+<file path=ppt/slides/slide13.xml><?xml version="1.0" encoding="utf-8"?>
+<p:sld xmlns:a="http://schemas.openxmlformats.org/drawingml/2006/main" xmlns:r="http://schemas.openxmlformats.org/officeDocument/2006/relationships" xmlns:p="http://schemas.openxmlformats.org/presentationml/2006/main">
+  <p:cSld>
+    <p:spTree>
+      <p:nvGrpSpPr>
+        <p:cNvPr id="1" name=""/>
+        <p:cNvGrpSpPr/>
+        <p:nvPr/>
+      </p:nvGrpSpPr>
+      <p:grpSpPr>
+        <a:xfrm>
+          <a:off x="0" y="0"/>
+          <a:ext cx="0" cy="0"/>
+          <a:chOff x="0" y="0"/>
+          <a:chExt cx="0" cy="0"/>
+        </a:xfrm>
+      </p:grpSpPr>
+      <p:sp>
+        <p:nvSpPr>
+          <p:cNvPr id="2" name="Title 1">
+            <a:extLst>
+              <a:ext uri="{FF2B5EF4-FFF2-40B4-BE49-F238E27FC236}">
+                <a16:creationId xmlns:a16="http://schemas.microsoft.com/office/drawing/2014/main" id="{14EF7B26-C6A7-45C2-9CF3-D8EC6D697C49}"/>
+              </a:ext>
+            </a:extLst>
+          </p:cNvPr>
+          <p:cNvSpPr>
+            <a:spLocks noGrp="1"/>
+          </p:cNvSpPr>
+          <p:nvPr>
+            <p:ph type="title"/>
+          </p:nvPr>
+        </p:nvSpPr>
+        <p:spPr>
+          <a:xfrm>
+            <a:off x="581192" y="702156"/>
+            <a:ext cx="11029616" cy="531026"/>
+          </a:xfrm>
+        </p:spPr>
+        <p:txBody>
+          <a:bodyPr/>
+          <a:lstStyle/>
+          <a:p>
+            <a:r>
+              <a:rPr lang="en-US" dirty="0"/>
+              <a:t>Entity framework – Migrations - 2 </a:t>
+            </a:r>
+          </a:p>
+        </p:txBody>
+      </p:sp>
+      <p:sp>
+        <p:nvSpPr>
+          <p:cNvPr id="6" name="TextBox 5">
+            <a:extLst>
+              <a:ext uri="{FF2B5EF4-FFF2-40B4-BE49-F238E27FC236}">
+                <a16:creationId xmlns:a16="http://schemas.microsoft.com/office/drawing/2014/main" id="{F0757538-8F3F-44B0-ACBA-7E8E1520BAEA}"/>
+              </a:ext>
+            </a:extLst>
+          </p:cNvPr>
+          <p:cNvSpPr txBox="1"/>
+          <p:nvPr/>
+        </p:nvSpPr>
+        <p:spPr>
+          <a:xfrm>
+            <a:off x="151002" y="1238614"/>
+            <a:ext cx="10258514" cy="369332"/>
+          </a:xfrm>
+          <a:prstGeom prst="rect">
+            <a:avLst/>
+          </a:prstGeom>
+          <a:noFill/>
+        </p:spPr>
+        <p:txBody>
+          <a:bodyPr wrap="none" rtlCol="0">
+            <a:spAutoFit/>
+          </a:bodyPr>
+          <a:lstStyle/>
+          <a:p>
+            <a:r>
+              <a:rPr lang="en-US" dirty="0"/>
+              <a:t>EF Core recognized one to many relationship. It also inferred the primary key and foreign key constraints.</a:t>
+            </a:r>
+          </a:p>
+        </p:txBody>
+      </p:sp>
+      <p:pic>
+        <p:nvPicPr>
+          <p:cNvPr id="3" name="Picture 2">
+            <a:extLst>
+              <a:ext uri="{FF2B5EF4-FFF2-40B4-BE49-F238E27FC236}">
+                <a16:creationId xmlns:a16="http://schemas.microsoft.com/office/drawing/2014/main" id="{0F6CB41E-CBA3-4097-A7BE-C745D0C226C4}"/>
+              </a:ext>
+            </a:extLst>
+          </p:cNvPr>
+          <p:cNvPicPr>
+            <a:picLocks noChangeAspect="1"/>
+          </p:cNvPicPr>
+          <p:nvPr/>
+        </p:nvPicPr>
+        <p:blipFill>
+          <a:blip r:embed="rId2"/>
+          <a:stretch>
+            <a:fillRect/>
+          </a:stretch>
+        </p:blipFill>
+        <p:spPr>
+          <a:xfrm>
+            <a:off x="151002" y="1734380"/>
+            <a:ext cx="11229975" cy="2181225"/>
+          </a:xfrm>
+          <a:prstGeom prst="rect">
+            <a:avLst/>
+          </a:prstGeom>
+        </p:spPr>
+      </p:pic>
+      <p:pic>
+        <p:nvPicPr>
+          <p:cNvPr id="5" name="Picture 4">
+            <a:extLst>
+              <a:ext uri="{FF2B5EF4-FFF2-40B4-BE49-F238E27FC236}">
+                <a16:creationId xmlns:a16="http://schemas.microsoft.com/office/drawing/2014/main" id="{6C010DC2-89F1-4CF5-9161-6A11409DB5DD}"/>
+              </a:ext>
+            </a:extLst>
+          </p:cNvPr>
+          <p:cNvPicPr>
+            <a:picLocks noChangeAspect="1"/>
+          </p:cNvPicPr>
+          <p:nvPr/>
+        </p:nvPicPr>
+        <p:blipFill>
+          <a:blip r:embed="rId3"/>
+          <a:stretch>
+            <a:fillRect/>
+          </a:stretch>
+        </p:blipFill>
+        <p:spPr>
+          <a:xfrm>
+            <a:off x="0" y="4675446"/>
+            <a:ext cx="12192000" cy="1114373"/>
+          </a:xfrm>
+          <a:prstGeom prst="rect">
+            <a:avLst/>
+          </a:prstGeom>
+        </p:spPr>
+      </p:pic>
+      <p:sp>
+        <p:nvSpPr>
+          <p:cNvPr id="8" name="TextBox 7">
+            <a:extLst>
+              <a:ext uri="{FF2B5EF4-FFF2-40B4-BE49-F238E27FC236}">
+                <a16:creationId xmlns:a16="http://schemas.microsoft.com/office/drawing/2014/main" id="{3CFC2459-2FF8-4A98-B806-70C5067D8977}"/>
+              </a:ext>
+            </a:extLst>
+          </p:cNvPr>
+          <p:cNvSpPr txBox="1"/>
+          <p:nvPr/>
+        </p:nvSpPr>
+        <p:spPr>
+          <a:xfrm>
+            <a:off x="0" y="4306114"/>
+            <a:ext cx="6326475" cy="369332"/>
+          </a:xfrm>
+          <a:prstGeom prst="rect">
+            <a:avLst/>
+          </a:prstGeom>
+          <a:noFill/>
+        </p:spPr>
+        <p:txBody>
+          <a:bodyPr wrap="none" rtlCol="0">
+            <a:spAutoFit/>
+          </a:bodyPr>
+          <a:lstStyle/>
+          <a:p>
+            <a:r>
+              <a:rPr lang="en-US" dirty="0"/>
+              <a:t>It creates index for every foreign key that describes in the model</a:t>
+            </a:r>
+          </a:p>
+        </p:txBody>
+      </p:sp>
+    </p:spTree>
+    <p:extLst>
+      <p:ext uri="{BB962C8B-B14F-4D97-AF65-F5344CB8AC3E}">
+        <p14:creationId xmlns:p14="http://schemas.microsoft.com/office/powerpoint/2010/main" val="2419270993"/>
+      </p:ext>
+    </p:extLst>
+  </p:cSld>
+  <p:clrMapOvr>
+    <a:masterClrMapping/>
+  </p:clrMapOvr>
+</p:sld>
+</file>
+
+<file path=ppt/slides/slide14.xml><?xml version="1.0" encoding="utf-8"?>
+<p:sld xmlns:a="http://schemas.openxmlformats.org/drawingml/2006/main" xmlns:r="http://schemas.openxmlformats.org/officeDocument/2006/relationships" xmlns:p="http://schemas.openxmlformats.org/presentationml/2006/main">
+  <p:cSld>
+    <p:spTree>
+      <p:nvGrpSpPr>
+        <p:cNvPr id="1" name=""/>
+        <p:cNvGrpSpPr/>
+        <p:nvPr/>
+      </p:nvGrpSpPr>
+      <p:grpSpPr>
+        <a:xfrm>
+          <a:off x="0" y="0"/>
+          <a:ext cx="0" cy="0"/>
+          <a:chOff x="0" y="0"/>
+          <a:chExt cx="0" cy="0"/>
+        </a:xfrm>
+      </p:grpSpPr>
+      <p:sp>
+        <p:nvSpPr>
+          <p:cNvPr id="2" name="Title 1">
+            <a:extLst>
+              <a:ext uri="{FF2B5EF4-FFF2-40B4-BE49-F238E27FC236}">
+                <a16:creationId xmlns:a16="http://schemas.microsoft.com/office/drawing/2014/main" id="{FF2823D2-BC3F-4551-806D-0851F15E71B5}"/>
+              </a:ext>
+            </a:extLst>
+          </p:cNvPr>
+          <p:cNvSpPr>
+            <a:spLocks noGrp="1"/>
+          </p:cNvSpPr>
+          <p:nvPr>
+            <p:ph type="title"/>
+          </p:nvPr>
+        </p:nvSpPr>
+        <p:spPr>
+          <a:xfrm>
+            <a:off x="581192" y="702156"/>
+            <a:ext cx="11029616" cy="539415"/>
+          </a:xfrm>
+        </p:spPr>
+        <p:txBody>
+          <a:bodyPr/>
+          <a:lstStyle/>
+          <a:p>
+            <a:r>
+              <a:rPr lang="en-US" dirty="0"/>
+              <a:t>Entity framework – Migrations - 3</a:t>
+            </a:r>
+          </a:p>
+        </p:txBody>
+      </p:sp>
+      <p:pic>
+        <p:nvPicPr>
+          <p:cNvPr id="4" name="Picture 3">
+            <a:extLst>
+              <a:ext uri="{FF2B5EF4-FFF2-40B4-BE49-F238E27FC236}">
+                <a16:creationId xmlns:a16="http://schemas.microsoft.com/office/drawing/2014/main" id="{D55FCEA1-CEAF-4F0A-B99D-2C6950F8DA28}"/>
+              </a:ext>
+            </a:extLst>
+          </p:cNvPr>
+          <p:cNvPicPr>
+            <a:picLocks noChangeAspect="1"/>
+          </p:cNvPicPr>
+          <p:nvPr/>
+        </p:nvPicPr>
+        <p:blipFill>
+          <a:blip r:embed="rId2"/>
+          <a:stretch>
+            <a:fillRect/>
+          </a:stretch>
+        </p:blipFill>
+        <p:spPr>
+          <a:xfrm>
+            <a:off x="0" y="1609725"/>
+            <a:ext cx="11791950" cy="1819275"/>
+          </a:xfrm>
+          <a:prstGeom prst="rect">
+            <a:avLst/>
+          </a:prstGeom>
+        </p:spPr>
+      </p:pic>
+      <p:sp>
+        <p:nvSpPr>
+          <p:cNvPr id="5" name="TextBox 4">
+            <a:extLst>
+              <a:ext uri="{FF2B5EF4-FFF2-40B4-BE49-F238E27FC236}">
+                <a16:creationId xmlns:a16="http://schemas.microsoft.com/office/drawing/2014/main" id="{B7B88561-83CE-4A19-98EA-5A21386A2312}"/>
+              </a:ext>
+            </a:extLst>
+          </p:cNvPr>
+          <p:cNvSpPr txBox="1"/>
+          <p:nvPr/>
+        </p:nvSpPr>
+        <p:spPr>
+          <a:xfrm>
+            <a:off x="0" y="1240393"/>
+            <a:ext cx="4056623" cy="369332"/>
+          </a:xfrm>
+          <a:prstGeom prst="rect">
+            <a:avLst/>
+          </a:prstGeom>
+          <a:noFill/>
+        </p:spPr>
+        <p:txBody>
+          <a:bodyPr wrap="none" rtlCol="0">
+            <a:spAutoFit/>
+          </a:bodyPr>
+          <a:lstStyle/>
+          <a:p>
+            <a:r>
+              <a:rPr lang="en-US" dirty="0"/>
+              <a:t>Ever if we want to unwind the migration.</a:t>
+            </a:r>
+          </a:p>
+        </p:txBody>
+      </p:sp>
+      <p:sp>
+        <p:nvSpPr>
+          <p:cNvPr id="6" name="TextBox 5">
+            <a:extLst>
+              <a:ext uri="{FF2B5EF4-FFF2-40B4-BE49-F238E27FC236}">
+                <a16:creationId xmlns:a16="http://schemas.microsoft.com/office/drawing/2014/main" id="{F86E89DA-03AE-483B-B5D6-24A032425E34}"/>
+              </a:ext>
+            </a:extLst>
+          </p:cNvPr>
+          <p:cNvSpPr txBox="1"/>
+          <p:nvPr/>
+        </p:nvSpPr>
+        <p:spPr>
+          <a:xfrm>
+            <a:off x="149487" y="3613325"/>
+            <a:ext cx="4265527" cy="646331"/>
+          </a:xfrm>
+          <a:prstGeom prst="rect">
+            <a:avLst/>
+          </a:prstGeom>
+          <a:noFill/>
+        </p:spPr>
+        <p:txBody>
+          <a:bodyPr wrap="none" rtlCol="0">
+            <a:spAutoFit/>
+          </a:bodyPr>
+          <a:lstStyle/>
+          <a:p>
+            <a:r>
+              <a:rPr lang="en-US" dirty="0"/>
+              <a:t>Development database : update-database</a:t>
+            </a:r>
+          </a:p>
+          <a:p>
+            <a:r>
+              <a:rPr lang="en-US" dirty="0"/>
+              <a:t>Production database : script-migration</a:t>
+            </a:r>
+          </a:p>
+        </p:txBody>
+      </p:sp>
+    </p:spTree>
+    <p:extLst>
+      <p:ext uri="{BB962C8B-B14F-4D97-AF65-F5344CB8AC3E}">
+        <p14:creationId xmlns:p14="http://schemas.microsoft.com/office/powerpoint/2010/main" val="1579933862"/>
+      </p:ext>
+    </p:extLst>
+  </p:cSld>
+  <p:clrMapOvr>
+    <a:masterClrMapping/>
+  </p:clrMapOvr>
+</p:sld>
+</file>
+
+<file path=ppt/slides/slide15.xml><?xml version="1.0" encoding="utf-8"?>
+<p:sld xmlns:a="http://schemas.openxmlformats.org/drawingml/2006/main" xmlns:r="http://schemas.openxmlformats.org/officeDocument/2006/relationships" xmlns:p="http://schemas.openxmlformats.org/presentationml/2006/main">
+  <p:cSld>
+    <p:spTree>
+      <p:nvGrpSpPr>
+        <p:cNvPr id="1" name=""/>
+        <p:cNvGrpSpPr/>
+        <p:nvPr/>
+      </p:nvGrpSpPr>
+      <p:grpSpPr>
+        <a:xfrm>
+          <a:off x="0" y="0"/>
+          <a:ext cx="0" cy="0"/>
+          <a:chOff x="0" y="0"/>
+          <a:chExt cx="0" cy="0"/>
+        </a:xfrm>
+      </p:grpSpPr>
+      <p:sp>
+        <p:nvSpPr>
+          <p:cNvPr id="2" name="Title 1">
+            <a:extLst>
+              <a:ext uri="{FF2B5EF4-FFF2-40B4-BE49-F238E27FC236}">
+                <a16:creationId xmlns:a16="http://schemas.microsoft.com/office/drawing/2014/main" id="{61D5D873-7191-4141-ABFE-AC94AB09162B}"/>
+              </a:ext>
+            </a:extLst>
+          </p:cNvPr>
+          <p:cNvSpPr>
+            <a:spLocks noGrp="1"/>
+          </p:cNvSpPr>
+          <p:nvPr>
+            <p:ph type="title"/>
+          </p:nvPr>
+        </p:nvSpPr>
+        <p:spPr>
+          <a:xfrm>
+            <a:off x="581192" y="702156"/>
+            <a:ext cx="11029616" cy="556193"/>
+          </a:xfrm>
+        </p:spPr>
+        <p:txBody>
+          <a:bodyPr/>
+          <a:lstStyle/>
+          <a:p>
+            <a:r>
+              <a:rPr lang="en-US" dirty="0"/>
+              <a:t>Production-script migration</a:t>
+            </a:r>
+          </a:p>
+        </p:txBody>
+      </p:sp>
+      <p:pic>
+        <p:nvPicPr>
+          <p:cNvPr id="4" name="Picture 3">
+            <a:extLst>
+              <a:ext uri="{FF2B5EF4-FFF2-40B4-BE49-F238E27FC236}">
+                <a16:creationId xmlns:a16="http://schemas.microsoft.com/office/drawing/2014/main" id="{AA0BAFF2-F5F6-4A9A-AC8B-7AAD98052966}"/>
+              </a:ext>
+            </a:extLst>
+          </p:cNvPr>
+          <p:cNvPicPr>
+            <a:picLocks noChangeAspect="1"/>
+          </p:cNvPicPr>
+          <p:nvPr/>
+        </p:nvPicPr>
+        <p:blipFill>
+          <a:blip r:embed="rId2"/>
+          <a:stretch>
+            <a:fillRect/>
+          </a:stretch>
+        </p:blipFill>
+        <p:spPr>
+          <a:xfrm>
+            <a:off x="109886" y="1258349"/>
+            <a:ext cx="9153525" cy="5034531"/>
+          </a:xfrm>
+          <a:prstGeom prst="rect">
+            <a:avLst/>
+          </a:prstGeom>
+        </p:spPr>
+      </p:pic>
+    </p:spTree>
+    <p:extLst>
+      <p:ext uri="{BB962C8B-B14F-4D97-AF65-F5344CB8AC3E}">
+        <p14:creationId xmlns:p14="http://schemas.microsoft.com/office/powerpoint/2010/main" val="91281575"/>
+      </p:ext>
+    </p:extLst>
+  </p:cSld>
+  <p:clrMapOvr>
+    <a:masterClrMapping/>
+  </p:clrMapOvr>
+</p:sld>
+</file>
+
+<file path=ppt/slides/slide16.xml><?xml version="1.0" encoding="utf-8"?>
+<p:sld xmlns:a="http://schemas.openxmlformats.org/drawingml/2006/main" xmlns:r="http://schemas.openxmlformats.org/officeDocument/2006/relationships" xmlns:p="http://schemas.openxmlformats.org/presentationml/2006/main">
+  <p:cSld>
+    <p:spTree>
+      <p:nvGrpSpPr>
+        <p:cNvPr id="1" name=""/>
+        <p:cNvGrpSpPr/>
+        <p:nvPr/>
+      </p:nvGrpSpPr>
+      <p:grpSpPr>
+        <a:xfrm>
+          <a:off x="0" y="0"/>
+          <a:ext cx="0" cy="0"/>
+          <a:chOff x="0" y="0"/>
+          <a:chExt cx="0" cy="0"/>
+        </a:xfrm>
+      </p:grpSpPr>
+      <p:sp>
+        <p:nvSpPr>
+          <p:cNvPr id="2" name="Title 1">
+            <a:extLst>
+              <a:ext uri="{FF2B5EF4-FFF2-40B4-BE49-F238E27FC236}">
+                <a16:creationId xmlns:a16="http://schemas.microsoft.com/office/drawing/2014/main" id="{6E10E21D-4669-4BBF-931F-1061751CB209}"/>
+              </a:ext>
+            </a:extLst>
+          </p:cNvPr>
+          <p:cNvSpPr>
+            <a:spLocks noGrp="1"/>
+          </p:cNvSpPr>
+          <p:nvPr>
+            <p:ph type="title"/>
+          </p:nvPr>
+        </p:nvSpPr>
+        <p:spPr>
+          <a:xfrm>
+            <a:off x="581192" y="702156"/>
+            <a:ext cx="11029616" cy="463914"/>
+          </a:xfrm>
+        </p:spPr>
+        <p:txBody>
+          <a:bodyPr>
+            <a:normAutofit fontScale="90000"/>
+          </a:bodyPr>
+          <a:lstStyle/>
+          <a:p>
+            <a:r>
+              <a:rPr lang="en-US" dirty="0"/>
+              <a:t>Update database</a:t>
+            </a:r>
+          </a:p>
+        </p:txBody>
+      </p:sp>
+      <p:pic>
+        <p:nvPicPr>
+          <p:cNvPr id="4" name="Picture 3">
+            <a:extLst>
+              <a:ext uri="{FF2B5EF4-FFF2-40B4-BE49-F238E27FC236}">
+                <a16:creationId xmlns:a16="http://schemas.microsoft.com/office/drawing/2014/main" id="{D4080135-02B7-4F28-9DD9-3F2FAFFFFE00}"/>
+              </a:ext>
+            </a:extLst>
+          </p:cNvPr>
+          <p:cNvPicPr>
+            <a:picLocks noChangeAspect="1"/>
+          </p:cNvPicPr>
+          <p:nvPr/>
+        </p:nvPicPr>
+        <p:blipFill>
+          <a:blip r:embed="rId2"/>
+          <a:stretch>
+            <a:fillRect/>
+          </a:stretch>
+        </p:blipFill>
+        <p:spPr>
+          <a:xfrm>
+            <a:off x="67113" y="1166070"/>
+            <a:ext cx="12192000" cy="4349996"/>
+          </a:xfrm>
+          <a:prstGeom prst="rect">
+            <a:avLst/>
+          </a:prstGeom>
+        </p:spPr>
+      </p:pic>
+      <p:pic>
+        <p:nvPicPr>
+          <p:cNvPr id="5" name="Picture 4">
+            <a:extLst>
+              <a:ext uri="{FF2B5EF4-FFF2-40B4-BE49-F238E27FC236}">
+                <a16:creationId xmlns:a16="http://schemas.microsoft.com/office/drawing/2014/main" id="{816F2ECF-02C0-4ADF-8DDE-C990477797C3}"/>
+              </a:ext>
+            </a:extLst>
+          </p:cNvPr>
+          <p:cNvPicPr>
+            <a:picLocks noChangeAspect="1"/>
+          </p:cNvPicPr>
+          <p:nvPr/>
+        </p:nvPicPr>
+        <p:blipFill>
+          <a:blip r:embed="rId3"/>
+          <a:stretch>
+            <a:fillRect/>
+          </a:stretch>
+        </p:blipFill>
+        <p:spPr>
+          <a:xfrm>
+            <a:off x="0" y="5691930"/>
+            <a:ext cx="4333875" cy="933450"/>
+          </a:xfrm>
+          <a:prstGeom prst="rect">
+            <a:avLst/>
+          </a:prstGeom>
+        </p:spPr>
+      </p:pic>
+      <p:pic>
+        <p:nvPicPr>
+          <p:cNvPr id="6" name="Picture 5">
+            <a:extLst>
+              <a:ext uri="{FF2B5EF4-FFF2-40B4-BE49-F238E27FC236}">
+                <a16:creationId xmlns:a16="http://schemas.microsoft.com/office/drawing/2014/main" id="{3B4AAB64-3919-4578-AC12-AB262F0381C4}"/>
+              </a:ext>
+            </a:extLst>
+          </p:cNvPr>
+          <p:cNvPicPr>
+            <a:picLocks noChangeAspect="1"/>
+          </p:cNvPicPr>
+          <p:nvPr/>
+        </p:nvPicPr>
+        <p:blipFill>
+          <a:blip r:embed="rId4"/>
+          <a:stretch>
+            <a:fillRect/>
+          </a:stretch>
+        </p:blipFill>
+        <p:spPr>
+          <a:xfrm>
+            <a:off x="4396880" y="5633207"/>
+            <a:ext cx="3733800" cy="923925"/>
+          </a:xfrm>
+          <a:prstGeom prst="rect">
+            <a:avLst/>
+          </a:prstGeom>
+        </p:spPr>
+      </p:pic>
+      <p:pic>
+        <p:nvPicPr>
+          <p:cNvPr id="7" name="Picture 6">
+            <a:extLst>
+              <a:ext uri="{FF2B5EF4-FFF2-40B4-BE49-F238E27FC236}">
+                <a16:creationId xmlns:a16="http://schemas.microsoft.com/office/drawing/2014/main" id="{A875268A-E0C5-494D-972B-29A206273CA9}"/>
+              </a:ext>
+            </a:extLst>
+          </p:cNvPr>
+          <p:cNvPicPr>
+            <a:picLocks noChangeAspect="1"/>
+          </p:cNvPicPr>
+          <p:nvPr/>
+        </p:nvPicPr>
+        <p:blipFill>
+          <a:blip r:embed="rId5"/>
+          <a:stretch>
+            <a:fillRect/>
+          </a:stretch>
+        </p:blipFill>
+        <p:spPr>
+          <a:xfrm>
+            <a:off x="7200462" y="3895725"/>
+            <a:ext cx="4924425" cy="2962275"/>
+          </a:xfrm>
+          <a:prstGeom prst="rect">
+            <a:avLst/>
+          </a:prstGeom>
+        </p:spPr>
+      </p:pic>
+    </p:spTree>
+    <p:extLst>
+      <p:ext uri="{BB962C8B-B14F-4D97-AF65-F5344CB8AC3E}">
+        <p14:creationId xmlns:p14="http://schemas.microsoft.com/office/powerpoint/2010/main" val="136903934"/>
+      </p:ext>
+    </p:extLst>
+  </p:cSld>
+  <p:clrMapOvr>
+    <a:masterClrMapping/>
+  </p:clrMapOvr>
+</p:sld>
+</file>
+
+<file path=ppt/slides/slide17.xml><?xml version="1.0" encoding="utf-8"?>
+<p:sld xmlns:a="http://schemas.openxmlformats.org/drawingml/2006/main" xmlns:r="http://schemas.openxmlformats.org/officeDocument/2006/relationships" xmlns:p="http://schemas.openxmlformats.org/presentationml/2006/main">
+  <p:cSld>
+    <p:spTree>
+      <p:nvGrpSpPr>
+        <p:cNvPr id="1" name=""/>
+        <p:cNvGrpSpPr/>
+        <p:nvPr/>
+      </p:nvGrpSpPr>
+      <p:grpSpPr>
+        <a:xfrm>
+          <a:off x="0" y="0"/>
+          <a:ext cx="0" cy="0"/>
+          <a:chOff x="0" y="0"/>
+          <a:chExt cx="0" cy="0"/>
+        </a:xfrm>
+      </p:grpSpPr>
+      <p:sp>
+        <p:nvSpPr>
+          <p:cNvPr id="2" name="Title 1">
+            <a:extLst>
+              <a:ext uri="{FF2B5EF4-FFF2-40B4-BE49-F238E27FC236}">
+                <a16:creationId xmlns:a16="http://schemas.microsoft.com/office/drawing/2014/main" id="{B31AC23D-9412-4E59-971A-853C3347141A}"/>
+              </a:ext>
+            </a:extLst>
+          </p:cNvPr>
+          <p:cNvSpPr>
+            <a:spLocks noGrp="1"/>
+          </p:cNvSpPr>
+          <p:nvPr>
+            <p:ph type="title"/>
+          </p:nvPr>
+        </p:nvSpPr>
+        <p:spPr>
+          <a:xfrm>
+            <a:off x="581192" y="702156"/>
+            <a:ext cx="11029616" cy="485709"/>
+          </a:xfrm>
+        </p:spPr>
+        <p:txBody>
+          <a:bodyPr>
+            <a:normAutofit fontScale="90000"/>
+          </a:bodyPr>
+          <a:lstStyle/>
+          <a:p>
+            <a:r>
+              <a:rPr lang="en-US" dirty="0"/>
+              <a:t>GENERATE ER DIAGRAM</a:t>
+            </a:r>
+          </a:p>
+        </p:txBody>
+      </p:sp>
+      <p:pic>
+        <p:nvPicPr>
+          <p:cNvPr id="4" name="Picture 3">
+            <a:extLst>
+              <a:ext uri="{FF2B5EF4-FFF2-40B4-BE49-F238E27FC236}">
+                <a16:creationId xmlns:a16="http://schemas.microsoft.com/office/drawing/2014/main" id="{70C041A9-C5B9-4274-8CEA-3845E63E0ECA}"/>
+              </a:ext>
+            </a:extLst>
+          </p:cNvPr>
+          <p:cNvPicPr>
+            <a:picLocks noChangeAspect="1"/>
+          </p:cNvPicPr>
+          <p:nvPr/>
+        </p:nvPicPr>
+        <p:blipFill>
+          <a:blip r:embed="rId2"/>
+          <a:stretch>
+            <a:fillRect/>
+          </a:stretch>
+        </p:blipFill>
+        <p:spPr>
+          <a:xfrm>
+            <a:off x="5232696" y="1301809"/>
+            <a:ext cx="4991100" cy="3962400"/>
+          </a:xfrm>
+          <a:prstGeom prst="rect">
+            <a:avLst/>
+          </a:prstGeom>
+        </p:spPr>
+      </p:pic>
+      <p:pic>
+        <p:nvPicPr>
+          <p:cNvPr id="5" name="Picture 4">
+            <a:extLst>
+              <a:ext uri="{FF2B5EF4-FFF2-40B4-BE49-F238E27FC236}">
+                <a16:creationId xmlns:a16="http://schemas.microsoft.com/office/drawing/2014/main" id="{9086AD89-AF36-429E-B471-280969539A95}"/>
+              </a:ext>
+            </a:extLst>
+          </p:cNvPr>
+          <p:cNvPicPr>
+            <a:picLocks noChangeAspect="1"/>
+          </p:cNvPicPr>
+          <p:nvPr/>
+        </p:nvPicPr>
+        <p:blipFill>
+          <a:blip r:embed="rId3"/>
+          <a:stretch>
+            <a:fillRect/>
+          </a:stretch>
+        </p:blipFill>
+        <p:spPr>
+          <a:xfrm>
+            <a:off x="248584" y="1301809"/>
+            <a:ext cx="3781425" cy="3810000"/>
+          </a:xfrm>
+          <a:prstGeom prst="rect">
+            <a:avLst/>
+          </a:prstGeom>
+        </p:spPr>
+      </p:pic>
+    </p:spTree>
+    <p:extLst>
+      <p:ext uri="{BB962C8B-B14F-4D97-AF65-F5344CB8AC3E}">
+        <p14:creationId xmlns:p14="http://schemas.microsoft.com/office/powerpoint/2010/main" val="609222961"/>
+      </p:ext>
+    </p:extLst>
+  </p:cSld>
+  <p:clrMapOvr>
+    <a:masterClrMapping/>
+  </p:clrMapOvr>
+</p:sld>
+</file>
+
+<file path=ppt/slides/slide18.xml><?xml version="1.0" encoding="utf-8"?>
+<p:sld xmlns:a="http://schemas.openxmlformats.org/drawingml/2006/main" xmlns:r="http://schemas.openxmlformats.org/officeDocument/2006/relationships" xmlns:p="http://schemas.openxmlformats.org/presentationml/2006/main">
+  <p:cSld>
+    <p:spTree>
+      <p:nvGrpSpPr>
+        <p:cNvPr id="1" name=""/>
+        <p:cNvGrpSpPr/>
+        <p:nvPr/>
+      </p:nvGrpSpPr>
+      <p:grpSpPr>
+        <a:xfrm>
+          <a:off x="0" y="0"/>
+          <a:ext cx="0" cy="0"/>
+          <a:chOff x="0" y="0"/>
+          <a:chExt cx="0" cy="0"/>
+        </a:xfrm>
+      </p:grpSpPr>
+      <p:sp>
+        <p:nvSpPr>
+          <p:cNvPr id="2" name="Title 1">
+            <a:extLst>
+              <a:ext uri="{FF2B5EF4-FFF2-40B4-BE49-F238E27FC236}">
+                <a16:creationId xmlns:a16="http://schemas.microsoft.com/office/drawing/2014/main" id="{52150873-D792-4587-B569-D170B9C2EAB5}"/>
+              </a:ext>
+            </a:extLst>
+          </p:cNvPr>
+          <p:cNvSpPr>
+            <a:spLocks noGrp="1"/>
+          </p:cNvSpPr>
+          <p:nvPr>
+            <p:ph type="title"/>
+          </p:nvPr>
+        </p:nvSpPr>
+        <p:spPr>
+          <a:xfrm>
+            <a:off x="581192" y="702156"/>
+            <a:ext cx="11029616" cy="640083"/>
+          </a:xfrm>
+        </p:spPr>
+        <p:txBody>
+          <a:bodyPr/>
+          <a:lstStyle/>
+          <a:p>
+            <a:r>
+              <a:rPr lang="en-US" dirty="0"/>
+              <a:t>Reverse engineer an existing database - 1</a:t>
+            </a:r>
+          </a:p>
+        </p:txBody>
+      </p:sp>
+      <p:sp>
+        <p:nvSpPr>
+          <p:cNvPr id="4" name="TextBox 3">
+            <a:extLst>
+              <a:ext uri="{FF2B5EF4-FFF2-40B4-BE49-F238E27FC236}">
+                <a16:creationId xmlns:a16="http://schemas.microsoft.com/office/drawing/2014/main" id="{C9891367-99B2-4E76-8859-DF531AE71004}"/>
+              </a:ext>
+            </a:extLst>
+          </p:cNvPr>
+          <p:cNvSpPr txBox="1"/>
+          <p:nvPr/>
+        </p:nvSpPr>
+        <p:spPr>
+          <a:xfrm>
+            <a:off x="192946" y="1348487"/>
+            <a:ext cx="9702721" cy="1477328"/>
+          </a:xfrm>
+          <a:prstGeom prst="rect">
+            <a:avLst/>
+          </a:prstGeom>
+          <a:noFill/>
+        </p:spPr>
+        <p:txBody>
+          <a:bodyPr wrap="none" rtlCol="0">
+            <a:spAutoFit/>
+          </a:bodyPr>
+          <a:lstStyle/>
+          <a:p>
+            <a:r>
+              <a:rPr lang="en-US" dirty="0"/>
+              <a:t>Create </a:t>
+            </a:r>
+            <a:r>
+              <a:rPr lang="en-US" dirty="0" err="1"/>
+              <a:t>DBContext</a:t>
+            </a:r>
+            <a:r>
+              <a:rPr lang="en-US" dirty="0"/>
+              <a:t> and Classes from database.</a:t>
+            </a:r>
+          </a:p>
+          <a:p>
+            <a:r>
+              <a:rPr lang="en-US" dirty="0"/>
+              <a:t>Updating model is not currently supported whenever database changes.</a:t>
+            </a:r>
+          </a:p>
+          <a:p>
+            <a:endParaRPr lang="en-US" dirty="0"/>
+          </a:p>
+          <a:p>
+            <a:r>
+              <a:rPr lang="en-US" dirty="0"/>
+              <a:t>Transition to migrations is not pretty. </a:t>
+            </a:r>
+          </a:p>
+          <a:p>
+            <a:r>
+              <a:rPr lang="en-US" dirty="0"/>
+              <a:t>Workarounds: https://cmatskas.com/ef-core-migrations-with-existing-database-schema-and-data/</a:t>
+            </a:r>
+          </a:p>
+        </p:txBody>
+      </p:sp>
+      <p:pic>
+        <p:nvPicPr>
+          <p:cNvPr id="5" name="Picture 4">
+            <a:extLst>
+              <a:ext uri="{FF2B5EF4-FFF2-40B4-BE49-F238E27FC236}">
+                <a16:creationId xmlns:a16="http://schemas.microsoft.com/office/drawing/2014/main" id="{50EF3348-859E-4B62-A217-4ED50EED7493}"/>
+              </a:ext>
+            </a:extLst>
+          </p:cNvPr>
+          <p:cNvPicPr>
+            <a:picLocks noChangeAspect="1"/>
+          </p:cNvPicPr>
+          <p:nvPr/>
+        </p:nvPicPr>
+        <p:blipFill>
+          <a:blip r:embed="rId2"/>
+          <a:stretch>
+            <a:fillRect/>
+          </a:stretch>
+        </p:blipFill>
+        <p:spPr>
+          <a:xfrm>
+            <a:off x="192946" y="2768362"/>
+            <a:ext cx="9305925" cy="333375"/>
+          </a:xfrm>
+          <a:prstGeom prst="rect">
+            <a:avLst/>
+          </a:prstGeom>
+        </p:spPr>
+      </p:pic>
+      <p:pic>
+        <p:nvPicPr>
+          <p:cNvPr id="6" name="Picture 5">
+            <a:extLst>
+              <a:ext uri="{FF2B5EF4-FFF2-40B4-BE49-F238E27FC236}">
+                <a16:creationId xmlns:a16="http://schemas.microsoft.com/office/drawing/2014/main" id="{25829CF4-F62D-4285-A9EB-67A2E8F1D7C2}"/>
+              </a:ext>
+            </a:extLst>
+          </p:cNvPr>
+          <p:cNvPicPr>
+            <a:picLocks noChangeAspect="1"/>
+          </p:cNvPicPr>
+          <p:nvPr/>
+        </p:nvPicPr>
+        <p:blipFill>
+          <a:blip r:embed="rId3"/>
+          <a:stretch>
+            <a:fillRect/>
+          </a:stretch>
+        </p:blipFill>
+        <p:spPr>
+          <a:xfrm>
+            <a:off x="57150" y="3402828"/>
+            <a:ext cx="6038850" cy="3476625"/>
+          </a:xfrm>
+          <a:prstGeom prst="rect">
+            <a:avLst/>
+          </a:prstGeom>
+        </p:spPr>
+      </p:pic>
+      <p:sp>
+        <p:nvSpPr>
+          <p:cNvPr id="7" name="TextBox 6">
+            <a:extLst>
+              <a:ext uri="{FF2B5EF4-FFF2-40B4-BE49-F238E27FC236}">
+                <a16:creationId xmlns:a16="http://schemas.microsoft.com/office/drawing/2014/main" id="{7F55BBE6-96EE-4264-917B-51E90713CEFA}"/>
+              </a:ext>
+            </a:extLst>
+          </p:cNvPr>
+          <p:cNvSpPr txBox="1"/>
+          <p:nvPr/>
+        </p:nvSpPr>
+        <p:spPr>
+          <a:xfrm>
+            <a:off x="57150" y="3059668"/>
+            <a:ext cx="5679696" cy="369332"/>
+          </a:xfrm>
+          <a:prstGeom prst="rect">
+            <a:avLst/>
+          </a:prstGeom>
+          <a:noFill/>
+        </p:spPr>
+        <p:txBody>
+          <a:bodyPr wrap="none" rtlCol="0">
+            <a:spAutoFit/>
+          </a:bodyPr>
+          <a:lstStyle/>
+          <a:p>
+            <a:r>
+              <a:rPr lang="en-US" dirty="0"/>
+              <a:t>EF Core default to </a:t>
+            </a:r>
+            <a:r>
+              <a:rPr lang="en-US" dirty="0" err="1"/>
+              <a:t>ICollection</a:t>
+            </a:r>
+            <a:r>
+              <a:rPr lang="en-US" dirty="0"/>
+              <a:t> and initializing the Quotes. </a:t>
+            </a:r>
+          </a:p>
+        </p:txBody>
+      </p:sp>
+    </p:spTree>
+    <p:extLst>
+      <p:ext uri="{BB962C8B-B14F-4D97-AF65-F5344CB8AC3E}">
+        <p14:creationId xmlns:p14="http://schemas.microsoft.com/office/powerpoint/2010/main" val="264340426"/>
+      </p:ext>
+    </p:extLst>
+  </p:cSld>
+  <p:clrMapOvr>
+    <a:masterClrMapping/>
+  </p:clrMapOvr>
+</p:sld>
+</file>
+
+<file path=ppt/slides/slide19.xml><?xml version="1.0" encoding="utf-8"?>
+<p:sld xmlns:a="http://schemas.openxmlformats.org/drawingml/2006/main" xmlns:r="http://schemas.openxmlformats.org/officeDocument/2006/relationships" xmlns:p="http://schemas.openxmlformats.org/presentationml/2006/main">
+  <p:cSld>
+    <p:spTree>
+      <p:nvGrpSpPr>
+        <p:cNvPr id="1" name=""/>
+        <p:cNvGrpSpPr/>
+        <p:nvPr/>
+      </p:nvGrpSpPr>
+      <p:grpSpPr>
+        <a:xfrm>
+          <a:off x="0" y="0"/>
+          <a:ext cx="0" cy="0"/>
+          <a:chOff x="0" y="0"/>
+          <a:chExt cx="0" cy="0"/>
+        </a:xfrm>
+      </p:grpSpPr>
+      <p:sp>
+        <p:nvSpPr>
+          <p:cNvPr id="2" name="Title 1">
+            <a:extLst>
+              <a:ext uri="{FF2B5EF4-FFF2-40B4-BE49-F238E27FC236}">
+                <a16:creationId xmlns:a16="http://schemas.microsoft.com/office/drawing/2014/main" id="{52150873-D792-4587-B569-D170B9C2EAB5}"/>
+              </a:ext>
+            </a:extLst>
+          </p:cNvPr>
+          <p:cNvSpPr>
+            <a:spLocks noGrp="1"/>
+          </p:cNvSpPr>
+          <p:nvPr>
+            <p:ph type="title"/>
+          </p:nvPr>
+        </p:nvSpPr>
+        <p:spPr>
+          <a:xfrm>
+            <a:off x="581192" y="702156"/>
+            <a:ext cx="11029616" cy="640083"/>
+          </a:xfrm>
+        </p:spPr>
+        <p:txBody>
+          <a:bodyPr/>
+          <a:lstStyle/>
+          <a:p>
+            <a:r>
+              <a:rPr lang="en-US" dirty="0"/>
+              <a:t>Reverse engineer an existing database - 2</a:t>
+            </a:r>
+          </a:p>
+        </p:txBody>
+      </p:sp>
+      <p:sp>
+        <p:nvSpPr>
+          <p:cNvPr id="4" name="TextBox 3">
+            <a:extLst>
+              <a:ext uri="{FF2B5EF4-FFF2-40B4-BE49-F238E27FC236}">
+                <a16:creationId xmlns:a16="http://schemas.microsoft.com/office/drawing/2014/main" id="{C9891367-99B2-4E76-8859-DF531AE71004}"/>
+              </a:ext>
+            </a:extLst>
+          </p:cNvPr>
+          <p:cNvSpPr txBox="1"/>
+          <p:nvPr/>
+        </p:nvSpPr>
+        <p:spPr>
+          <a:xfrm>
+            <a:off x="192946" y="1348487"/>
+            <a:ext cx="8188075" cy="369332"/>
+          </a:xfrm>
+          <a:prstGeom prst="rect">
+            <a:avLst/>
+          </a:prstGeom>
+          <a:noFill/>
+        </p:spPr>
+        <p:txBody>
+          <a:bodyPr wrap="none" rtlCol="0">
+            <a:spAutoFit/>
+          </a:bodyPr>
+          <a:lstStyle/>
+          <a:p>
+            <a:r>
+              <a:rPr lang="en-US" dirty="0"/>
+              <a:t>EF Core 5 scaffolding now defaults to creating singular names for the entity classes</a:t>
+            </a:r>
+          </a:p>
+        </p:txBody>
+      </p:sp>
+      <p:pic>
+        <p:nvPicPr>
+          <p:cNvPr id="3" name="Picture 2">
+            <a:extLst>
+              <a:ext uri="{FF2B5EF4-FFF2-40B4-BE49-F238E27FC236}">
+                <a16:creationId xmlns:a16="http://schemas.microsoft.com/office/drawing/2014/main" id="{BDA426E2-7733-427E-83A0-667C8A18F805}"/>
+              </a:ext>
+            </a:extLst>
+          </p:cNvPr>
+          <p:cNvPicPr>
+            <a:picLocks noChangeAspect="1"/>
+          </p:cNvPicPr>
+          <p:nvPr/>
+        </p:nvPicPr>
+        <p:blipFill>
+          <a:blip r:embed="rId2"/>
+          <a:stretch>
+            <a:fillRect/>
+          </a:stretch>
+        </p:blipFill>
+        <p:spPr>
+          <a:xfrm>
+            <a:off x="192946" y="1791967"/>
+            <a:ext cx="1428750" cy="371475"/>
+          </a:xfrm>
+          <a:prstGeom prst="rect">
+            <a:avLst/>
+          </a:prstGeom>
+        </p:spPr>
+      </p:pic>
+      <p:sp>
+        <p:nvSpPr>
+          <p:cNvPr id="8" name="TextBox 7">
+            <a:extLst>
+              <a:ext uri="{FF2B5EF4-FFF2-40B4-BE49-F238E27FC236}">
+                <a16:creationId xmlns:a16="http://schemas.microsoft.com/office/drawing/2014/main" id="{E945E6E6-03FB-465C-B10F-EA30E4F70DF1}"/>
+              </a:ext>
+            </a:extLst>
+          </p:cNvPr>
+          <p:cNvSpPr txBox="1"/>
+          <p:nvPr/>
+        </p:nvSpPr>
+        <p:spPr>
+          <a:xfrm>
+            <a:off x="192946" y="2163442"/>
+            <a:ext cx="12147171" cy="1477328"/>
+          </a:xfrm>
+          <a:prstGeom prst="rect">
+            <a:avLst/>
+          </a:prstGeom>
+          <a:noFill/>
+        </p:spPr>
+        <p:txBody>
+          <a:bodyPr wrap="none" rtlCol="0">
+            <a:spAutoFit/>
+          </a:bodyPr>
+          <a:lstStyle/>
+          <a:p>
+            <a:r>
+              <a:rPr lang="en-US" dirty="0"/>
+              <a:t>EF Core uses “Conventions” when creating classes which are the “Default assumptions”.</a:t>
+            </a:r>
+          </a:p>
+          <a:p>
+            <a:r>
+              <a:rPr lang="en-US" dirty="0"/>
+              <a:t>Sometimes, those convention don’t fall under real intent. This can be overridden using fluent mappings. So that the classes</a:t>
+            </a:r>
+          </a:p>
+          <a:p>
+            <a:r>
+              <a:rPr lang="en-US" dirty="0"/>
+              <a:t>can be mapped correctly to the database.</a:t>
+            </a:r>
+          </a:p>
+          <a:p>
+            <a:r>
+              <a:rPr lang="en-US" dirty="0"/>
+              <a:t>Another way to override conventions is to use Data Annotations. This can be achieved in Entity classes but mappings are</a:t>
+            </a:r>
+          </a:p>
+          <a:p>
+            <a:r>
+              <a:rPr lang="en-US" dirty="0"/>
+              <a:t>Limited.</a:t>
+            </a:r>
+          </a:p>
+        </p:txBody>
+      </p:sp>
+    </p:spTree>
+    <p:extLst>
+      <p:ext uri="{BB962C8B-B14F-4D97-AF65-F5344CB8AC3E}">
+        <p14:creationId xmlns:p14="http://schemas.microsoft.com/office/powerpoint/2010/main" val="1688560279"/>
       </p:ext>
     </p:extLst>
   </p:cSld>
@@ -5907,12 +7636,12 @@
 </file>
 
 <file path=customXml/item1.xml><?xml version="1.0" encoding="utf-8"?>
-<p:properties xmlns:p="http://schemas.microsoft.com/office/2006/metadata/properties" xmlns:xsi="http://www.w3.org/2001/XMLSchema-instance" xmlns:pc="http://schemas.microsoft.com/office/infopath/2007/PartnerControls">
-  <documentManagement>
-    <Status xmlns="71af3243-3dd4-4a8d-8c0d-dd76da1f02a5">Not started</Status>
-    <MediaServiceKeyPoints xmlns="71af3243-3dd4-4a8d-8c0d-dd76da1f02a5" xsi:nil="true"/>
-  </documentManagement>
-</p:properties>
+<?mso-contentType ?>
+<FormTemplates xmlns="http://schemas.microsoft.com/sharepoint/v3/contenttype/forms">
+  <Display>DocumentLibraryForm</Display>
+  <Edit>DocumentLibraryForm</Edit>
+  <New>DocumentLibraryForm</New>
+</FormTemplates>
 </file>
 
 <file path=customXml/item2.xml><?xml version="1.0" encoding="utf-8"?>
@@ -6137,20 +7866,18 @@
 </file>
 
 <file path=customXml/item3.xml><?xml version="1.0" encoding="utf-8"?>
-<?mso-contentType ?>
-<FormTemplates xmlns="http://schemas.microsoft.com/sharepoint/v3/contenttype/forms">
-  <Display>DocumentLibraryForm</Display>
-  <Edit>DocumentLibraryForm</Edit>
-  <New>DocumentLibraryForm</New>
-</FormTemplates>
+<p:properties xmlns:p="http://schemas.microsoft.com/office/2006/metadata/properties" xmlns:xsi="http://www.w3.org/2001/XMLSchema-instance" xmlns:pc="http://schemas.microsoft.com/office/infopath/2007/PartnerControls">
+  <documentManagement>
+    <Status xmlns="71af3243-3dd4-4a8d-8c0d-dd76da1f02a5">Not started</Status>
+    <MediaServiceKeyPoints xmlns="71af3243-3dd4-4a8d-8c0d-dd76da1f02a5" xsi:nil="true"/>
+  </documentManagement>
+</p:properties>
 </file>
 
 <file path=customXml/itemProps1.xml><?xml version="1.0" encoding="utf-8"?>
-<ds:datastoreItem xmlns:ds="http://schemas.openxmlformats.org/officeDocument/2006/customXml" ds:itemID="{8D289AE2-D2AE-49D1-AFAC-3A79F6794255}">
+<ds:datastoreItem xmlns:ds="http://schemas.openxmlformats.org/officeDocument/2006/customXml" ds:itemID="{927BD4C1-B6B1-4715-ABF9-E660A51A4EA0}">
   <ds:schemaRefs>
-    <ds:schemaRef ds:uri="http://schemas.microsoft.com/office/2006/metadata/properties"/>
-    <ds:schemaRef ds:uri="http://schemas.microsoft.com/office/infopath/2007/PartnerControls"/>
-    <ds:schemaRef ds:uri="71af3243-3dd4-4a8d-8c0d-dd76da1f02a5"/>
+    <ds:schemaRef ds:uri="http://schemas.microsoft.com/sharepoint/v3/contenttype/forms"/>
   </ds:schemaRefs>
 </ds:datastoreItem>
 </file>
@@ -6175,9 +7902,11 @@
 </file>
 
 <file path=customXml/itemProps3.xml><?xml version="1.0" encoding="utf-8"?>
-<ds:datastoreItem xmlns:ds="http://schemas.openxmlformats.org/officeDocument/2006/customXml" ds:itemID="{927BD4C1-B6B1-4715-ABF9-E660A51A4EA0}">
+<ds:datastoreItem xmlns:ds="http://schemas.openxmlformats.org/officeDocument/2006/customXml" ds:itemID="{8D289AE2-D2AE-49D1-AFAC-3A79F6794255}">
   <ds:schemaRefs>
-    <ds:schemaRef ds:uri="http://schemas.microsoft.com/sharepoint/v3/contenttype/forms"/>
+    <ds:schemaRef ds:uri="http://schemas.microsoft.com/office/2006/metadata/properties"/>
+    <ds:schemaRef ds:uri="http://schemas.microsoft.com/office/infopath/2007/PartnerControls"/>
+    <ds:schemaRef ds:uri="71af3243-3dd4-4a8d-8c0d-dd76da1f02a5"/>
   </ds:schemaRefs>
 </ds:datastoreItem>
 </file>
</xml_diff>

<commit_message>
Defining relationahips in your model (One to One, One to Many, Many to Many).
</commit_message>
<xml_diff>
--- a/Presentation/AzurePostgreSQl.pptx
+++ b/Presentation/AzurePostgreSQl.pptx
@@ -5,7 +5,7 @@
     <p:sldMasterId id="2147483712" r:id="rId4"/>
   </p:sldMasterIdLst>
   <p:notesMasterIdLst>
-    <p:notesMasterId r:id="rId24"/>
+    <p:notesMasterId r:id="rId29"/>
   </p:notesMasterIdLst>
   <p:sldIdLst>
     <p:sldId id="257" r:id="rId5"/>
@@ -27,6 +27,11 @@
     <p:sldId id="315" r:id="rId21"/>
     <p:sldId id="316" r:id="rId22"/>
     <p:sldId id="317" r:id="rId23"/>
+    <p:sldId id="318" r:id="rId24"/>
+    <p:sldId id="319" r:id="rId25"/>
+    <p:sldId id="320" r:id="rId26"/>
+    <p:sldId id="321" r:id="rId27"/>
+    <p:sldId id="322" r:id="rId28"/>
   </p:sldIdLst>
   <p:sldSz cx="12192000" cy="6858000"/>
   <p:notesSz cx="6858000" cy="9144000"/>
@@ -215,7 +220,7 @@
           <a:p>
             <a:fld id="{C5935FA4-E1A2-4535-94CE-D42A248BB67A}" type="datetimeFigureOut">
               <a:rPr lang="en-US" smtClean="0"/>
-              <a:t>4/2/2021</a:t>
+              <a:t>4/4/2021</a:t>
             </a:fld>
             <a:endParaRPr lang="en-US"/>
           </a:p>
@@ -720,7 +725,7 @@
           <a:p>
             <a:fld id="{ED291B17-9318-49DB-B28B-6E5994AE9581}" type="datetime1">
               <a:rPr lang="en-US" smtClean="0"/>
-              <a:t>4/2/2021</a:t>
+              <a:t>4/4/2021</a:t>
             </a:fld>
             <a:endParaRPr lang="en-US" dirty="0"/>
           </a:p>
@@ -923,7 +928,7 @@
           <a:p>
             <a:fld id="{2CED4963-E985-44C4-B8C4-FDD613B7C2F8}" type="datetime1">
               <a:rPr lang="en-US" smtClean="0"/>
-              <a:t>4/2/2021</a:t>
+              <a:t>4/4/2021</a:t>
             </a:fld>
             <a:endParaRPr lang="en-US" dirty="0"/>
           </a:p>
@@ -1285,7 +1290,7 @@
           <a:p>
             <a:fld id="{ED291B17-9318-49DB-B28B-6E5994AE9581}" type="datetime1">
               <a:rPr lang="en-US" smtClean="0"/>
-              <a:t>4/2/2021</a:t>
+              <a:t>4/4/2021</a:t>
             </a:fld>
             <a:endParaRPr lang="en-US" dirty="0"/>
           </a:p>
@@ -1483,7 +1488,7 @@
           <a:p>
             <a:fld id="{78DD82B9-B8EE-4375-B6FF-88FA6ABB15D9}" type="datetime1">
               <a:rPr lang="en-US" smtClean="0"/>
-              <a:t>4/2/2021</a:t>
+              <a:t>4/4/2021</a:t>
             </a:fld>
             <a:endParaRPr lang="en-US" dirty="0"/>
           </a:p>
@@ -1795,7 +1800,7 @@
           <a:p>
             <a:fld id="{B2497495-0637-405E-AE64-5CC7506D51F5}" type="datetime1">
               <a:rPr lang="en-US" smtClean="0"/>
-              <a:t>4/2/2021</a:t>
+              <a:t>4/4/2021</a:t>
             </a:fld>
             <a:endParaRPr lang="en-US" dirty="0"/>
           </a:p>
@@ -2048,7 +2053,7 @@
           <a:p>
             <a:fld id="{7BFFD690-9426-415D-8B65-26881E07B2D4}" type="datetime1">
               <a:rPr lang="en-US" smtClean="0"/>
-              <a:t>4/2/2021</a:t>
+              <a:t>4/4/2021</a:t>
             </a:fld>
             <a:endParaRPr lang="en-US" dirty="0"/>
           </a:p>
@@ -2470,7 +2475,7 @@
           <a:p>
             <a:fld id="{04C4989A-474C-40DE-95B9-011C28B71673}" type="datetime1">
               <a:rPr lang="en-US" smtClean="0"/>
-              <a:t>4/2/2021</a:t>
+              <a:t>4/4/2021</a:t>
             </a:fld>
             <a:endParaRPr lang="en-US" dirty="0"/>
           </a:p>
@@ -2593,7 +2598,7 @@
           <a:p>
             <a:fld id="{5DB4ED54-5B5E-4A04-93D3-5772E3CE3818}" type="datetime1">
               <a:rPr lang="en-US" smtClean="0"/>
-              <a:t>4/2/2021</a:t>
+              <a:t>4/4/2021</a:t>
             </a:fld>
             <a:endParaRPr lang="en-US" dirty="0"/>
           </a:p>
@@ -2688,7 +2693,7 @@
           <a:p>
             <a:fld id="{4EDE50D6-574B-40AF-946F-D52A04ADE379}" type="datetime1">
               <a:rPr lang="en-US" smtClean="0"/>
-              <a:t>4/2/2021</a:t>
+              <a:t>4/4/2021</a:t>
             </a:fld>
             <a:endParaRPr lang="en-US" dirty="0"/>
           </a:p>
@@ -3065,7 +3070,7 @@
           <a:p>
             <a:fld id="{D82884F1-FFEA-405F-9602-3DCA865EDA4E}" type="datetime1">
               <a:rPr lang="en-US" smtClean="0"/>
-              <a:t>4/2/2021</a:t>
+              <a:t>4/4/2021</a:t>
             </a:fld>
             <a:endParaRPr lang="en-US" dirty="0"/>
           </a:p>
@@ -3358,7 +3363,7 @@
           <a:p>
             <a:fld id="{7E18DB4A-8810-4A10-AD5C-D5E2C667F5B3}" type="datetime1">
               <a:rPr lang="en-US" smtClean="0"/>
-              <a:t>4/2/2021</a:t>
+              <a:t>4/4/2021</a:t>
             </a:fld>
             <a:endParaRPr lang="en-US" dirty="0"/>
           </a:p>
@@ -3573,7 +3578,7 @@
           <a:p>
             <a:fld id="{ED291B17-9318-49DB-B28B-6E5994AE9581}" type="datetime1">
               <a:rPr lang="en-US" smtClean="0"/>
-              <a:t>4/2/2021</a:t>
+              <a:t>4/4/2021</a:t>
             </a:fld>
             <a:endParaRPr lang="en-US" dirty="0"/>
           </a:p>
@@ -6361,6 +6366,751 @@
     <p:extLst>
       <p:ext uri="{BB962C8B-B14F-4D97-AF65-F5344CB8AC3E}">
         <p14:creationId xmlns:p14="http://schemas.microsoft.com/office/powerpoint/2010/main" val="3647734174"/>
+      </p:ext>
+    </p:extLst>
+  </p:cSld>
+  <p:clrMapOvr>
+    <a:masterClrMapping/>
+  </p:clrMapOvr>
+</p:sld>
+</file>
+
+<file path=ppt/slides/slide20.xml><?xml version="1.0" encoding="utf-8"?>
+<p:sld xmlns:a="http://schemas.openxmlformats.org/drawingml/2006/main" xmlns:r="http://schemas.openxmlformats.org/officeDocument/2006/relationships" xmlns:p="http://schemas.openxmlformats.org/presentationml/2006/main">
+  <p:cSld>
+    <p:spTree>
+      <p:nvGrpSpPr>
+        <p:cNvPr id="1" name=""/>
+        <p:cNvGrpSpPr/>
+        <p:nvPr/>
+      </p:nvGrpSpPr>
+      <p:grpSpPr>
+        <a:xfrm>
+          <a:off x="0" y="0"/>
+          <a:ext cx="0" cy="0"/>
+          <a:chOff x="0" y="0"/>
+          <a:chExt cx="0" cy="0"/>
+        </a:xfrm>
+      </p:grpSpPr>
+      <p:sp>
+        <p:nvSpPr>
+          <p:cNvPr id="2" name="Title 1">
+            <a:extLst>
+              <a:ext uri="{FF2B5EF4-FFF2-40B4-BE49-F238E27FC236}">
+                <a16:creationId xmlns:a16="http://schemas.microsoft.com/office/drawing/2014/main" id="{E191E41C-EB72-4204-BDD4-4206758C1A61}"/>
+              </a:ext>
+            </a:extLst>
+          </p:cNvPr>
+          <p:cNvSpPr>
+            <a:spLocks noGrp="1"/>
+          </p:cNvSpPr>
+          <p:nvPr>
+            <p:ph type="title"/>
+          </p:nvPr>
+        </p:nvSpPr>
+        <p:spPr>
+          <a:xfrm>
+            <a:off x="581192" y="702156"/>
+            <a:ext cx="11029616" cy="631694"/>
+          </a:xfrm>
+        </p:spPr>
+        <p:txBody>
+          <a:bodyPr/>
+          <a:lstStyle/>
+          <a:p>
+            <a:r>
+              <a:rPr lang="en-US" dirty="0"/>
+              <a:t>relationships</a:t>
+            </a:r>
+          </a:p>
+        </p:txBody>
+      </p:sp>
+      <p:sp>
+        <p:nvSpPr>
+          <p:cNvPr id="4" name="TextBox 3">
+            <a:extLst>
+              <a:ext uri="{FF2B5EF4-FFF2-40B4-BE49-F238E27FC236}">
+                <a16:creationId xmlns:a16="http://schemas.microsoft.com/office/drawing/2014/main" id="{662E2979-031D-49A9-830C-581862CE4B83}"/>
+              </a:ext>
+            </a:extLst>
+          </p:cNvPr>
+          <p:cNvSpPr txBox="1"/>
+          <p:nvPr/>
+        </p:nvSpPr>
+        <p:spPr>
+          <a:xfrm>
+            <a:off x="318782" y="1333850"/>
+            <a:ext cx="10484089" cy="1200329"/>
+          </a:xfrm>
+          <a:prstGeom prst="rect">
+            <a:avLst/>
+          </a:prstGeom>
+          <a:noFill/>
+        </p:spPr>
+        <p:txBody>
+          <a:bodyPr wrap="none" rtlCol="0">
+            <a:spAutoFit/>
+          </a:bodyPr>
+          <a:lstStyle/>
+          <a:p>
+            <a:r>
+              <a:rPr lang="en-US" dirty="0"/>
+              <a:t>public List&lt;Quote&gt; Quotes { get; set; } = new();</a:t>
+            </a:r>
+          </a:p>
+          <a:p>
+            <a:r>
+              <a:rPr lang="en-US" dirty="0"/>
+              <a:t>EF Core will also recognize Collection&lt;T&gt; and Enumerable&lt;T&gt;</a:t>
+            </a:r>
+          </a:p>
+          <a:p>
+            <a:endParaRPr lang="en-US" dirty="0"/>
+          </a:p>
+          <a:p>
+            <a:r>
+              <a:rPr lang="en-US" dirty="0"/>
+              <a:t>With EF Core 5, the addition of a join entity will not complicate the EF’s understanding of your relationship.</a:t>
+            </a:r>
+          </a:p>
+        </p:txBody>
+      </p:sp>
+      <p:pic>
+        <p:nvPicPr>
+          <p:cNvPr id="5" name="Picture 4">
+            <a:extLst>
+              <a:ext uri="{FF2B5EF4-FFF2-40B4-BE49-F238E27FC236}">
+                <a16:creationId xmlns:a16="http://schemas.microsoft.com/office/drawing/2014/main" id="{BBEB3935-20A6-4377-9632-881CE9E50D97}"/>
+              </a:ext>
+            </a:extLst>
+          </p:cNvPr>
+          <p:cNvPicPr>
+            <a:picLocks noChangeAspect="1"/>
+          </p:cNvPicPr>
+          <p:nvPr/>
+        </p:nvPicPr>
+        <p:blipFill>
+          <a:blip r:embed="rId2"/>
+          <a:stretch>
+            <a:fillRect/>
+          </a:stretch>
+        </p:blipFill>
+        <p:spPr>
+          <a:xfrm>
+            <a:off x="142876" y="4441211"/>
+            <a:ext cx="7219950" cy="1114425"/>
+          </a:xfrm>
+          <a:prstGeom prst="rect">
+            <a:avLst/>
+          </a:prstGeom>
+        </p:spPr>
+      </p:pic>
+      <p:pic>
+        <p:nvPicPr>
+          <p:cNvPr id="6" name="Picture 5">
+            <a:extLst>
+              <a:ext uri="{FF2B5EF4-FFF2-40B4-BE49-F238E27FC236}">
+                <a16:creationId xmlns:a16="http://schemas.microsoft.com/office/drawing/2014/main" id="{3FCF2366-5589-48C1-8237-D0D48FDEDEFE}"/>
+              </a:ext>
+            </a:extLst>
+          </p:cNvPr>
+          <p:cNvPicPr>
+            <a:picLocks noChangeAspect="1"/>
+          </p:cNvPicPr>
+          <p:nvPr/>
+        </p:nvPicPr>
+        <p:blipFill>
+          <a:blip r:embed="rId3"/>
+          <a:stretch>
+            <a:fillRect/>
+          </a:stretch>
+        </p:blipFill>
+        <p:spPr>
+          <a:xfrm>
+            <a:off x="271157" y="2584893"/>
+            <a:ext cx="3086100" cy="828675"/>
+          </a:xfrm>
+          <a:prstGeom prst="rect">
+            <a:avLst/>
+          </a:prstGeom>
+        </p:spPr>
+      </p:pic>
+      <p:pic>
+        <p:nvPicPr>
+          <p:cNvPr id="7" name="Picture 6">
+            <a:extLst>
+              <a:ext uri="{FF2B5EF4-FFF2-40B4-BE49-F238E27FC236}">
+                <a16:creationId xmlns:a16="http://schemas.microsoft.com/office/drawing/2014/main" id="{BA98AC99-D423-4AA9-9D37-7CCEDB236026}"/>
+              </a:ext>
+            </a:extLst>
+          </p:cNvPr>
+          <p:cNvPicPr>
+            <a:picLocks noChangeAspect="1"/>
+          </p:cNvPicPr>
+          <p:nvPr/>
+        </p:nvPicPr>
+        <p:blipFill>
+          <a:blip r:embed="rId4"/>
+          <a:stretch>
+            <a:fillRect/>
+          </a:stretch>
+        </p:blipFill>
+        <p:spPr>
+          <a:xfrm>
+            <a:off x="271157" y="3561822"/>
+            <a:ext cx="3657600" cy="762000"/>
+          </a:xfrm>
+          <a:prstGeom prst="rect">
+            <a:avLst/>
+          </a:prstGeom>
+        </p:spPr>
+      </p:pic>
+      <p:sp>
+        <p:nvSpPr>
+          <p:cNvPr id="8" name="Rectangle 7">
+            <a:extLst>
+              <a:ext uri="{FF2B5EF4-FFF2-40B4-BE49-F238E27FC236}">
+                <a16:creationId xmlns:a16="http://schemas.microsoft.com/office/drawing/2014/main" id="{5560B496-D8CD-46CF-A060-A7D09EEB554D}"/>
+              </a:ext>
+            </a:extLst>
+          </p:cNvPr>
+          <p:cNvSpPr/>
+          <p:nvPr/>
+        </p:nvSpPr>
+        <p:spPr>
+          <a:xfrm>
+            <a:off x="142876" y="5832678"/>
+            <a:ext cx="11029616" cy="369332"/>
+          </a:xfrm>
+          <a:prstGeom prst="rect">
+            <a:avLst/>
+          </a:prstGeom>
+        </p:spPr>
+        <p:txBody>
+          <a:bodyPr wrap="square">
+            <a:spAutoFit/>
+          </a:bodyPr>
+          <a:lstStyle/>
+          <a:p>
+            <a:r>
+              <a:rPr lang="en-US" dirty="0"/>
+              <a:t>https://www.codemag.com/Article/2010042/EF-Core-5-Building-on-the-Foundation</a:t>
+            </a:r>
+          </a:p>
+        </p:txBody>
+      </p:sp>
+    </p:spTree>
+    <p:extLst>
+      <p:ext uri="{BB962C8B-B14F-4D97-AF65-F5344CB8AC3E}">
+        <p14:creationId xmlns:p14="http://schemas.microsoft.com/office/powerpoint/2010/main" val="108350285"/>
+      </p:ext>
+    </p:extLst>
+  </p:cSld>
+  <p:clrMapOvr>
+    <a:masterClrMapping/>
+  </p:clrMapOvr>
+</p:sld>
+</file>
+
+<file path=ppt/slides/slide21.xml><?xml version="1.0" encoding="utf-8"?>
+<p:sld xmlns:a="http://schemas.openxmlformats.org/drawingml/2006/main" xmlns:r="http://schemas.openxmlformats.org/officeDocument/2006/relationships" xmlns:p="http://schemas.openxmlformats.org/presentationml/2006/main">
+  <p:cSld>
+    <p:spTree>
+      <p:nvGrpSpPr>
+        <p:cNvPr id="1" name=""/>
+        <p:cNvGrpSpPr/>
+        <p:nvPr/>
+      </p:nvGrpSpPr>
+      <p:grpSpPr>
+        <a:xfrm>
+          <a:off x="0" y="0"/>
+          <a:ext cx="0" cy="0"/>
+          <a:chOff x="0" y="0"/>
+          <a:chExt cx="0" cy="0"/>
+        </a:xfrm>
+      </p:grpSpPr>
+      <p:sp>
+        <p:nvSpPr>
+          <p:cNvPr id="2" name="Title 1">
+            <a:extLst>
+              <a:ext uri="{FF2B5EF4-FFF2-40B4-BE49-F238E27FC236}">
+                <a16:creationId xmlns:a16="http://schemas.microsoft.com/office/drawing/2014/main" id="{273C3FCB-63DD-4C51-AA04-7EB4877CF53B}"/>
+              </a:ext>
+            </a:extLst>
+          </p:cNvPr>
+          <p:cNvSpPr>
+            <a:spLocks noGrp="1"/>
+          </p:cNvSpPr>
+          <p:nvPr>
+            <p:ph type="title"/>
+          </p:nvPr>
+        </p:nvSpPr>
+        <p:spPr>
+          <a:xfrm>
+            <a:off x="581192" y="702156"/>
+            <a:ext cx="11029616" cy="488469"/>
+          </a:xfrm>
+        </p:spPr>
+        <p:txBody>
+          <a:bodyPr>
+            <a:normAutofit fontScale="90000"/>
+          </a:bodyPr>
+          <a:lstStyle/>
+          <a:p>
+            <a:r>
+              <a:rPr lang="en-US" dirty="0"/>
+              <a:t>Many to Many with payload</a:t>
+            </a:r>
+          </a:p>
+        </p:txBody>
+      </p:sp>
+      <p:pic>
+        <p:nvPicPr>
+          <p:cNvPr id="4" name="Picture 3">
+            <a:extLst>
+              <a:ext uri="{FF2B5EF4-FFF2-40B4-BE49-F238E27FC236}">
+                <a16:creationId xmlns:a16="http://schemas.microsoft.com/office/drawing/2014/main" id="{0B0AEB54-D7C1-4571-9806-D8B6CBF6F441}"/>
+              </a:ext>
+            </a:extLst>
+          </p:cNvPr>
+          <p:cNvPicPr>
+            <a:picLocks noChangeAspect="1"/>
+          </p:cNvPicPr>
+          <p:nvPr/>
+        </p:nvPicPr>
+        <p:blipFill>
+          <a:blip r:embed="rId2"/>
+          <a:stretch>
+            <a:fillRect/>
+          </a:stretch>
+        </p:blipFill>
+        <p:spPr>
+          <a:xfrm>
+            <a:off x="324017" y="1223962"/>
+            <a:ext cx="7229475" cy="1190625"/>
+          </a:xfrm>
+          <a:prstGeom prst="rect">
+            <a:avLst/>
+          </a:prstGeom>
+        </p:spPr>
+      </p:pic>
+      <p:pic>
+        <p:nvPicPr>
+          <p:cNvPr id="5" name="Picture 4">
+            <a:extLst>
+              <a:ext uri="{FF2B5EF4-FFF2-40B4-BE49-F238E27FC236}">
+                <a16:creationId xmlns:a16="http://schemas.microsoft.com/office/drawing/2014/main" id="{04AACCD4-09D5-48AF-A84A-CB66C0611941}"/>
+              </a:ext>
+            </a:extLst>
+          </p:cNvPr>
+          <p:cNvPicPr>
+            <a:picLocks noChangeAspect="1"/>
+          </p:cNvPicPr>
+          <p:nvPr/>
+        </p:nvPicPr>
+        <p:blipFill>
+          <a:blip r:embed="rId3"/>
+          <a:stretch>
+            <a:fillRect/>
+          </a:stretch>
+        </p:blipFill>
+        <p:spPr>
+          <a:xfrm>
+            <a:off x="324017" y="2633662"/>
+            <a:ext cx="6934200" cy="1914525"/>
+          </a:xfrm>
+          <a:prstGeom prst="rect">
+            <a:avLst/>
+          </a:prstGeom>
+        </p:spPr>
+      </p:pic>
+      <p:pic>
+        <p:nvPicPr>
+          <p:cNvPr id="6" name="Picture 5">
+            <a:extLst>
+              <a:ext uri="{FF2B5EF4-FFF2-40B4-BE49-F238E27FC236}">
+                <a16:creationId xmlns:a16="http://schemas.microsoft.com/office/drawing/2014/main" id="{99EA9168-2D23-4CD8-8624-739D7A97A078}"/>
+              </a:ext>
+            </a:extLst>
+          </p:cNvPr>
+          <p:cNvPicPr>
+            <a:picLocks noChangeAspect="1"/>
+          </p:cNvPicPr>
+          <p:nvPr/>
+        </p:nvPicPr>
+        <p:blipFill>
+          <a:blip r:embed="rId4"/>
+          <a:stretch>
+            <a:fillRect/>
+          </a:stretch>
+        </p:blipFill>
+        <p:spPr>
+          <a:xfrm>
+            <a:off x="352592" y="4767262"/>
+            <a:ext cx="7200900" cy="1209675"/>
+          </a:xfrm>
+          <a:prstGeom prst="rect">
+            <a:avLst/>
+          </a:prstGeom>
+        </p:spPr>
+      </p:pic>
+    </p:spTree>
+    <p:extLst>
+      <p:ext uri="{BB962C8B-B14F-4D97-AF65-F5344CB8AC3E}">
+        <p14:creationId xmlns:p14="http://schemas.microsoft.com/office/powerpoint/2010/main" val="1677916296"/>
+      </p:ext>
+    </p:extLst>
+  </p:cSld>
+  <p:clrMapOvr>
+    <a:masterClrMapping/>
+  </p:clrMapOvr>
+</p:sld>
+</file>
+
+<file path=ppt/slides/slide22.xml><?xml version="1.0" encoding="utf-8"?>
+<p:sld xmlns:a="http://schemas.openxmlformats.org/drawingml/2006/main" xmlns:r="http://schemas.openxmlformats.org/officeDocument/2006/relationships" xmlns:p="http://schemas.openxmlformats.org/presentationml/2006/main">
+  <p:cSld>
+    <p:spTree>
+      <p:nvGrpSpPr>
+        <p:cNvPr id="1" name=""/>
+        <p:cNvGrpSpPr/>
+        <p:nvPr/>
+      </p:nvGrpSpPr>
+      <p:grpSpPr>
+        <a:xfrm>
+          <a:off x="0" y="0"/>
+          <a:ext cx="0" cy="0"/>
+          <a:chOff x="0" y="0"/>
+          <a:chExt cx="0" cy="0"/>
+        </a:xfrm>
+      </p:grpSpPr>
+      <p:sp>
+        <p:nvSpPr>
+          <p:cNvPr id="2" name="Title 1">
+            <a:extLst>
+              <a:ext uri="{FF2B5EF4-FFF2-40B4-BE49-F238E27FC236}">
+                <a16:creationId xmlns:a16="http://schemas.microsoft.com/office/drawing/2014/main" id="{487BCE01-7060-4DCC-B515-5EA8D90113D1}"/>
+              </a:ext>
+            </a:extLst>
+          </p:cNvPr>
+          <p:cNvSpPr>
+            <a:spLocks noGrp="1"/>
+          </p:cNvSpPr>
+          <p:nvPr>
+            <p:ph type="title"/>
+          </p:nvPr>
+        </p:nvSpPr>
+        <p:spPr>
+          <a:xfrm>
+            <a:off x="581192" y="702156"/>
+            <a:ext cx="11029616" cy="583719"/>
+          </a:xfrm>
+        </p:spPr>
+        <p:txBody>
+          <a:bodyPr/>
+          <a:lstStyle/>
+          <a:p>
+            <a:r>
+              <a:rPr lang="en-US" dirty="0"/>
+              <a:t>One to one</a:t>
+            </a:r>
+          </a:p>
+        </p:txBody>
+      </p:sp>
+      <p:pic>
+        <p:nvPicPr>
+          <p:cNvPr id="4" name="Picture 3">
+            <a:extLst>
+              <a:ext uri="{FF2B5EF4-FFF2-40B4-BE49-F238E27FC236}">
+                <a16:creationId xmlns:a16="http://schemas.microsoft.com/office/drawing/2014/main" id="{6951EAF1-9CF2-4937-9C05-52032890FDC0}"/>
+              </a:ext>
+            </a:extLst>
+          </p:cNvPr>
+          <p:cNvPicPr>
+            <a:picLocks noChangeAspect="1"/>
+          </p:cNvPicPr>
+          <p:nvPr/>
+        </p:nvPicPr>
+        <p:blipFill>
+          <a:blip r:embed="rId2"/>
+          <a:stretch>
+            <a:fillRect/>
+          </a:stretch>
+        </p:blipFill>
+        <p:spPr>
+          <a:xfrm>
+            <a:off x="285750" y="1285875"/>
+            <a:ext cx="6896100" cy="1114425"/>
+          </a:xfrm>
+          <a:prstGeom prst="rect">
+            <a:avLst/>
+          </a:prstGeom>
+        </p:spPr>
+      </p:pic>
+      <p:pic>
+        <p:nvPicPr>
+          <p:cNvPr id="5" name="Picture 4">
+            <a:extLst>
+              <a:ext uri="{FF2B5EF4-FFF2-40B4-BE49-F238E27FC236}">
+                <a16:creationId xmlns:a16="http://schemas.microsoft.com/office/drawing/2014/main" id="{B0ED4FA0-37B1-445E-B2B8-FC5A8188D744}"/>
+              </a:ext>
+            </a:extLst>
+          </p:cNvPr>
+          <p:cNvPicPr>
+            <a:picLocks noChangeAspect="1"/>
+          </p:cNvPicPr>
+          <p:nvPr/>
+        </p:nvPicPr>
+        <p:blipFill>
+          <a:blip r:embed="rId3"/>
+          <a:stretch>
+            <a:fillRect/>
+          </a:stretch>
+        </p:blipFill>
+        <p:spPr>
+          <a:xfrm>
+            <a:off x="190500" y="2593494"/>
+            <a:ext cx="3381375" cy="781050"/>
+          </a:xfrm>
+          <a:prstGeom prst="rect">
+            <a:avLst/>
+          </a:prstGeom>
+        </p:spPr>
+      </p:pic>
+    </p:spTree>
+    <p:extLst>
+      <p:ext uri="{BB962C8B-B14F-4D97-AF65-F5344CB8AC3E}">
+        <p14:creationId xmlns:p14="http://schemas.microsoft.com/office/powerpoint/2010/main" val="2748345524"/>
+      </p:ext>
+    </p:extLst>
+  </p:cSld>
+  <p:clrMapOvr>
+    <a:masterClrMapping/>
+  </p:clrMapOvr>
+</p:sld>
+</file>
+
+<file path=ppt/slides/slide23.xml><?xml version="1.0" encoding="utf-8"?>
+<p:sld xmlns:a="http://schemas.openxmlformats.org/drawingml/2006/main" xmlns:r="http://schemas.openxmlformats.org/officeDocument/2006/relationships" xmlns:p="http://schemas.openxmlformats.org/presentationml/2006/main">
+  <p:cSld>
+    <p:spTree>
+      <p:nvGrpSpPr>
+        <p:cNvPr id="1" name=""/>
+        <p:cNvGrpSpPr/>
+        <p:nvPr/>
+      </p:nvGrpSpPr>
+      <p:grpSpPr>
+        <a:xfrm>
+          <a:off x="0" y="0"/>
+          <a:ext cx="0" cy="0"/>
+          <a:chOff x="0" y="0"/>
+          <a:chExt cx="0" cy="0"/>
+        </a:xfrm>
+      </p:grpSpPr>
+      <p:sp>
+        <p:nvSpPr>
+          <p:cNvPr id="2" name="Title 1">
+            <a:extLst>
+              <a:ext uri="{FF2B5EF4-FFF2-40B4-BE49-F238E27FC236}">
+                <a16:creationId xmlns:a16="http://schemas.microsoft.com/office/drawing/2014/main" id="{F66598FD-08ED-4464-9BE4-A911D089130F}"/>
+              </a:ext>
+            </a:extLst>
+          </p:cNvPr>
+          <p:cNvSpPr>
+            <a:spLocks noGrp="1"/>
+          </p:cNvSpPr>
+          <p:nvPr>
+            <p:ph type="title"/>
+          </p:nvPr>
+        </p:nvSpPr>
+        <p:spPr>
+          <a:xfrm>
+            <a:off x="581192" y="702156"/>
+            <a:ext cx="11029616" cy="431319"/>
+          </a:xfrm>
+        </p:spPr>
+        <p:txBody>
+          <a:bodyPr>
+            <a:normAutofit fontScale="90000"/>
+          </a:bodyPr>
+          <a:lstStyle/>
+          <a:p>
+            <a:r>
+              <a:rPr lang="en-US" dirty="0"/>
+              <a:t>EF Core POWER TOOLS – 1/2</a:t>
+            </a:r>
+          </a:p>
+        </p:txBody>
+      </p:sp>
+      <p:pic>
+        <p:nvPicPr>
+          <p:cNvPr id="4" name="Picture 3">
+            <a:extLst>
+              <a:ext uri="{FF2B5EF4-FFF2-40B4-BE49-F238E27FC236}">
+                <a16:creationId xmlns:a16="http://schemas.microsoft.com/office/drawing/2014/main" id="{397F0DEA-0F65-46DA-98B2-F23EA71FCB91}"/>
+              </a:ext>
+            </a:extLst>
+          </p:cNvPr>
+          <p:cNvPicPr>
+            <a:picLocks noChangeAspect="1"/>
+          </p:cNvPicPr>
+          <p:nvPr/>
+        </p:nvPicPr>
+        <p:blipFill>
+          <a:blip r:embed="rId2"/>
+          <a:stretch>
+            <a:fillRect/>
+          </a:stretch>
+        </p:blipFill>
+        <p:spPr>
+          <a:xfrm>
+            <a:off x="85725" y="1133475"/>
+            <a:ext cx="11877675" cy="3933825"/>
+          </a:xfrm>
+          <a:prstGeom prst="rect">
+            <a:avLst/>
+          </a:prstGeom>
+        </p:spPr>
+      </p:pic>
+      <p:sp>
+        <p:nvSpPr>
+          <p:cNvPr id="5" name="TextBox 4">
+            <a:extLst>
+              <a:ext uri="{FF2B5EF4-FFF2-40B4-BE49-F238E27FC236}">
+                <a16:creationId xmlns:a16="http://schemas.microsoft.com/office/drawing/2014/main" id="{F5D5C81C-E8AA-4724-9634-63E623F2D511}"/>
+              </a:ext>
+            </a:extLst>
+          </p:cNvPr>
+          <p:cNvSpPr txBox="1"/>
+          <p:nvPr/>
+        </p:nvSpPr>
+        <p:spPr>
+          <a:xfrm>
+            <a:off x="0" y="5539859"/>
+            <a:ext cx="7278787" cy="369332"/>
+          </a:xfrm>
+          <a:prstGeom prst="rect">
+            <a:avLst/>
+          </a:prstGeom>
+          <a:noFill/>
+        </p:spPr>
+        <p:txBody>
+          <a:bodyPr wrap="none" rtlCol="0">
+            <a:spAutoFit/>
+          </a:bodyPr>
+          <a:lstStyle/>
+          <a:p>
+            <a:r>
+              <a:rPr lang="en-US" dirty="0"/>
+              <a:t>EF core Power Tools also relies on </a:t>
+            </a:r>
+            <a:r>
+              <a:rPr lang="en-US" dirty="0" err="1"/>
+              <a:t>Microsoft.EntityFrameworkCore.Design</a:t>
+            </a:r>
+            <a:endParaRPr lang="en-US" dirty="0"/>
+          </a:p>
+        </p:txBody>
+      </p:sp>
+    </p:spTree>
+    <p:extLst>
+      <p:ext uri="{BB962C8B-B14F-4D97-AF65-F5344CB8AC3E}">
+        <p14:creationId xmlns:p14="http://schemas.microsoft.com/office/powerpoint/2010/main" val="2551807661"/>
+      </p:ext>
+    </p:extLst>
+  </p:cSld>
+  <p:clrMapOvr>
+    <a:masterClrMapping/>
+  </p:clrMapOvr>
+</p:sld>
+</file>
+
+<file path=ppt/slides/slide24.xml><?xml version="1.0" encoding="utf-8"?>
+<p:sld xmlns:a="http://schemas.openxmlformats.org/drawingml/2006/main" xmlns:r="http://schemas.openxmlformats.org/officeDocument/2006/relationships" xmlns:p="http://schemas.openxmlformats.org/presentationml/2006/main">
+  <p:cSld>
+    <p:spTree>
+      <p:nvGrpSpPr>
+        <p:cNvPr id="1" name=""/>
+        <p:cNvGrpSpPr/>
+        <p:nvPr/>
+      </p:nvGrpSpPr>
+      <p:grpSpPr>
+        <a:xfrm>
+          <a:off x="0" y="0"/>
+          <a:ext cx="0" cy="0"/>
+          <a:chOff x="0" y="0"/>
+          <a:chExt cx="0" cy="0"/>
+        </a:xfrm>
+      </p:grpSpPr>
+      <p:sp>
+        <p:nvSpPr>
+          <p:cNvPr id="2" name="Title 1">
+            <a:extLst>
+              <a:ext uri="{FF2B5EF4-FFF2-40B4-BE49-F238E27FC236}">
+                <a16:creationId xmlns:a16="http://schemas.microsoft.com/office/drawing/2014/main" id="{F66598FD-08ED-4464-9BE4-A911D089130F}"/>
+              </a:ext>
+            </a:extLst>
+          </p:cNvPr>
+          <p:cNvSpPr>
+            <a:spLocks noGrp="1"/>
+          </p:cNvSpPr>
+          <p:nvPr>
+            <p:ph type="title"/>
+          </p:nvPr>
+        </p:nvSpPr>
+        <p:spPr>
+          <a:xfrm>
+            <a:off x="581192" y="702156"/>
+            <a:ext cx="11029616" cy="431319"/>
+          </a:xfrm>
+        </p:spPr>
+        <p:txBody>
+          <a:bodyPr>
+            <a:normAutofit fontScale="90000"/>
+          </a:bodyPr>
+          <a:lstStyle/>
+          <a:p>
+            <a:r>
+              <a:rPr lang="en-US" dirty="0"/>
+              <a:t>EF Core POWER TOOLS – 2/2</a:t>
+            </a:r>
+          </a:p>
+        </p:txBody>
+      </p:sp>
+      <p:pic>
+        <p:nvPicPr>
+          <p:cNvPr id="3" name="Picture 2">
+            <a:extLst>
+              <a:ext uri="{FF2B5EF4-FFF2-40B4-BE49-F238E27FC236}">
+                <a16:creationId xmlns:a16="http://schemas.microsoft.com/office/drawing/2014/main" id="{1B53B16B-2A06-4CDB-95C1-B825A53A30D6}"/>
+              </a:ext>
+            </a:extLst>
+          </p:cNvPr>
+          <p:cNvPicPr>
+            <a:picLocks noChangeAspect="1"/>
+          </p:cNvPicPr>
+          <p:nvPr/>
+        </p:nvPicPr>
+        <p:blipFill>
+          <a:blip r:embed="rId2"/>
+          <a:stretch>
+            <a:fillRect/>
+          </a:stretch>
+        </p:blipFill>
+        <p:spPr>
+          <a:xfrm>
+            <a:off x="74321" y="1133475"/>
+            <a:ext cx="8905875" cy="4176756"/>
+          </a:xfrm>
+          <a:prstGeom prst="rect">
+            <a:avLst/>
+          </a:prstGeom>
+        </p:spPr>
+      </p:pic>
+    </p:spTree>
+    <p:extLst>
+      <p:ext uri="{BB962C8B-B14F-4D97-AF65-F5344CB8AC3E}">
+        <p14:creationId xmlns:p14="http://schemas.microsoft.com/office/powerpoint/2010/main" val="2814860294"/>
       </p:ext>
     </p:extLst>
   </p:cSld>
@@ -7636,12 +8386,12 @@
 </file>
 
 <file path=customXml/item1.xml><?xml version="1.0" encoding="utf-8"?>
-<?mso-contentType ?>
-<FormTemplates xmlns="http://schemas.microsoft.com/sharepoint/v3/contenttype/forms">
-  <Display>DocumentLibraryForm</Display>
-  <Edit>DocumentLibraryForm</Edit>
-  <New>DocumentLibraryForm</New>
-</FormTemplates>
+<p:properties xmlns:p="http://schemas.microsoft.com/office/2006/metadata/properties" xmlns:xsi="http://www.w3.org/2001/XMLSchema-instance" xmlns:pc="http://schemas.microsoft.com/office/infopath/2007/PartnerControls">
+  <documentManagement>
+    <Status xmlns="71af3243-3dd4-4a8d-8c0d-dd76da1f02a5">Not started</Status>
+    <MediaServiceKeyPoints xmlns="71af3243-3dd4-4a8d-8c0d-dd76da1f02a5" xsi:nil="true"/>
+  </documentManagement>
+</p:properties>
 </file>
 
 <file path=customXml/item2.xml><?xml version="1.0" encoding="utf-8"?>
@@ -7866,18 +8616,20 @@
 </file>
 
 <file path=customXml/item3.xml><?xml version="1.0" encoding="utf-8"?>
-<p:properties xmlns:p="http://schemas.microsoft.com/office/2006/metadata/properties" xmlns:xsi="http://www.w3.org/2001/XMLSchema-instance" xmlns:pc="http://schemas.microsoft.com/office/infopath/2007/PartnerControls">
-  <documentManagement>
-    <Status xmlns="71af3243-3dd4-4a8d-8c0d-dd76da1f02a5">Not started</Status>
-    <MediaServiceKeyPoints xmlns="71af3243-3dd4-4a8d-8c0d-dd76da1f02a5" xsi:nil="true"/>
-  </documentManagement>
-</p:properties>
+<?mso-contentType ?>
+<FormTemplates xmlns="http://schemas.microsoft.com/sharepoint/v3/contenttype/forms">
+  <Display>DocumentLibraryForm</Display>
+  <Edit>DocumentLibraryForm</Edit>
+  <New>DocumentLibraryForm</New>
+</FormTemplates>
 </file>
 
 <file path=customXml/itemProps1.xml><?xml version="1.0" encoding="utf-8"?>
-<ds:datastoreItem xmlns:ds="http://schemas.openxmlformats.org/officeDocument/2006/customXml" ds:itemID="{927BD4C1-B6B1-4715-ABF9-E660A51A4EA0}">
+<ds:datastoreItem xmlns:ds="http://schemas.openxmlformats.org/officeDocument/2006/customXml" ds:itemID="{8D289AE2-D2AE-49D1-AFAC-3A79F6794255}">
   <ds:schemaRefs>
-    <ds:schemaRef ds:uri="http://schemas.microsoft.com/sharepoint/v3/contenttype/forms"/>
+    <ds:schemaRef ds:uri="http://schemas.microsoft.com/office/2006/metadata/properties"/>
+    <ds:schemaRef ds:uri="http://schemas.microsoft.com/office/infopath/2007/PartnerControls"/>
+    <ds:schemaRef ds:uri="71af3243-3dd4-4a8d-8c0d-dd76da1f02a5"/>
   </ds:schemaRefs>
 </ds:datastoreItem>
 </file>
@@ -7902,11 +8654,9 @@
 </file>
 
 <file path=customXml/itemProps3.xml><?xml version="1.0" encoding="utf-8"?>
-<ds:datastoreItem xmlns:ds="http://schemas.openxmlformats.org/officeDocument/2006/customXml" ds:itemID="{8D289AE2-D2AE-49D1-AFAC-3A79F6794255}">
+<ds:datastoreItem xmlns:ds="http://schemas.openxmlformats.org/officeDocument/2006/customXml" ds:itemID="{927BD4C1-B6B1-4715-ABF9-E660A51A4EA0}">
   <ds:schemaRefs>
-    <ds:schemaRef ds:uri="http://schemas.microsoft.com/office/2006/metadata/properties"/>
-    <ds:schemaRef ds:uri="http://schemas.microsoft.com/office/infopath/2007/PartnerControls"/>
-    <ds:schemaRef ds:uri="71af3243-3dd4-4a8d-8c0d-dd76da1f02a5"/>
+    <ds:schemaRef ds:uri="http://schemas.microsoft.com/sharepoint/v3/contenttype/forms"/>
   </ds:schemaRefs>
 </ds:datastoreItem>
 </file>
</xml_diff>

<commit_message>
Interacting with your EF Core Data Model.
</commit_message>
<xml_diff>
--- a/Presentation/AzurePostgreSQl.pptx
+++ b/Presentation/AzurePostgreSQl.pptx
@@ -5,7 +5,7 @@
     <p:sldMasterId id="2147483712" r:id="rId4"/>
   </p:sldMasterIdLst>
   <p:notesMasterIdLst>
-    <p:notesMasterId r:id="rId29"/>
+    <p:notesMasterId r:id="rId31"/>
   </p:notesMasterIdLst>
   <p:sldIdLst>
     <p:sldId id="257" r:id="rId5"/>
@@ -32,6 +32,8 @@
     <p:sldId id="320" r:id="rId26"/>
     <p:sldId id="321" r:id="rId27"/>
     <p:sldId id="322" r:id="rId28"/>
+    <p:sldId id="323" r:id="rId29"/>
+    <p:sldId id="324" r:id="rId30"/>
   </p:sldIdLst>
   <p:sldSz cx="12192000" cy="6858000"/>
   <p:notesSz cx="6858000" cy="9144000"/>
@@ -220,7 +222,7 @@
           <a:p>
             <a:fld id="{C5935FA4-E1A2-4535-94CE-D42A248BB67A}" type="datetimeFigureOut">
               <a:rPr lang="en-US" smtClean="0"/>
-              <a:t>4/4/2021</a:t>
+              <a:t>4/24/2021</a:t>
             </a:fld>
             <a:endParaRPr lang="en-US"/>
           </a:p>
@@ -725,7 +727,7 @@
           <a:p>
             <a:fld id="{ED291B17-9318-49DB-B28B-6E5994AE9581}" type="datetime1">
               <a:rPr lang="en-US" smtClean="0"/>
-              <a:t>4/4/2021</a:t>
+              <a:t>4/24/2021</a:t>
             </a:fld>
             <a:endParaRPr lang="en-US" dirty="0"/>
           </a:p>
@@ -928,7 +930,7 @@
           <a:p>
             <a:fld id="{2CED4963-E985-44C4-B8C4-FDD613B7C2F8}" type="datetime1">
               <a:rPr lang="en-US" smtClean="0"/>
-              <a:t>4/4/2021</a:t>
+              <a:t>4/24/2021</a:t>
             </a:fld>
             <a:endParaRPr lang="en-US" dirty="0"/>
           </a:p>
@@ -1290,7 +1292,7 @@
           <a:p>
             <a:fld id="{ED291B17-9318-49DB-B28B-6E5994AE9581}" type="datetime1">
               <a:rPr lang="en-US" smtClean="0"/>
-              <a:t>4/4/2021</a:t>
+              <a:t>4/24/2021</a:t>
             </a:fld>
             <a:endParaRPr lang="en-US" dirty="0"/>
           </a:p>
@@ -1488,7 +1490,7 @@
           <a:p>
             <a:fld id="{78DD82B9-B8EE-4375-B6FF-88FA6ABB15D9}" type="datetime1">
               <a:rPr lang="en-US" smtClean="0"/>
-              <a:t>4/4/2021</a:t>
+              <a:t>4/24/2021</a:t>
             </a:fld>
             <a:endParaRPr lang="en-US" dirty="0"/>
           </a:p>
@@ -1800,7 +1802,7 @@
           <a:p>
             <a:fld id="{B2497495-0637-405E-AE64-5CC7506D51F5}" type="datetime1">
               <a:rPr lang="en-US" smtClean="0"/>
-              <a:t>4/4/2021</a:t>
+              <a:t>4/24/2021</a:t>
             </a:fld>
             <a:endParaRPr lang="en-US" dirty="0"/>
           </a:p>
@@ -2053,7 +2055,7 @@
           <a:p>
             <a:fld id="{7BFFD690-9426-415D-8B65-26881E07B2D4}" type="datetime1">
               <a:rPr lang="en-US" smtClean="0"/>
-              <a:t>4/4/2021</a:t>
+              <a:t>4/24/2021</a:t>
             </a:fld>
             <a:endParaRPr lang="en-US" dirty="0"/>
           </a:p>
@@ -2475,7 +2477,7 @@
           <a:p>
             <a:fld id="{04C4989A-474C-40DE-95B9-011C28B71673}" type="datetime1">
               <a:rPr lang="en-US" smtClean="0"/>
-              <a:t>4/4/2021</a:t>
+              <a:t>4/24/2021</a:t>
             </a:fld>
             <a:endParaRPr lang="en-US" dirty="0"/>
           </a:p>
@@ -2598,7 +2600,7 @@
           <a:p>
             <a:fld id="{5DB4ED54-5B5E-4A04-93D3-5772E3CE3818}" type="datetime1">
               <a:rPr lang="en-US" smtClean="0"/>
-              <a:t>4/4/2021</a:t>
+              <a:t>4/24/2021</a:t>
             </a:fld>
             <a:endParaRPr lang="en-US" dirty="0"/>
           </a:p>
@@ -2693,7 +2695,7 @@
           <a:p>
             <a:fld id="{4EDE50D6-574B-40AF-946F-D52A04ADE379}" type="datetime1">
               <a:rPr lang="en-US" smtClean="0"/>
-              <a:t>4/4/2021</a:t>
+              <a:t>4/24/2021</a:t>
             </a:fld>
             <a:endParaRPr lang="en-US" dirty="0"/>
           </a:p>
@@ -3070,7 +3072,7 @@
           <a:p>
             <a:fld id="{D82884F1-FFEA-405F-9602-3DCA865EDA4E}" type="datetime1">
               <a:rPr lang="en-US" smtClean="0"/>
-              <a:t>4/4/2021</a:t>
+              <a:t>4/24/2021</a:t>
             </a:fld>
             <a:endParaRPr lang="en-US" dirty="0"/>
           </a:p>
@@ -3363,7 +3365,7 @@
           <a:p>
             <a:fld id="{7E18DB4A-8810-4A10-AD5C-D5E2C667F5B3}" type="datetime1">
               <a:rPr lang="en-US" smtClean="0"/>
-              <a:t>4/4/2021</a:t>
+              <a:t>4/24/2021</a:t>
             </a:fld>
             <a:endParaRPr lang="en-US" dirty="0"/>
           </a:p>
@@ -3578,7 +3580,7 @@
           <a:p>
             <a:fld id="{ED291B17-9318-49DB-B28B-6E5994AE9581}" type="datetime1">
               <a:rPr lang="en-US" smtClean="0"/>
-              <a:t>4/4/2021</a:t>
+              <a:t>4/24/2021</a:t>
             </a:fld>
             <a:endParaRPr lang="en-US" dirty="0"/>
           </a:p>
@@ -7111,6 +7113,261 @@
     <p:extLst>
       <p:ext uri="{BB962C8B-B14F-4D97-AF65-F5344CB8AC3E}">
         <p14:creationId xmlns:p14="http://schemas.microsoft.com/office/powerpoint/2010/main" val="2814860294"/>
+      </p:ext>
+    </p:extLst>
+  </p:cSld>
+  <p:clrMapOvr>
+    <a:masterClrMapping/>
+  </p:clrMapOvr>
+</p:sld>
+</file>
+
+<file path=ppt/slides/slide25.xml><?xml version="1.0" encoding="utf-8"?>
+<p:sld xmlns:a="http://schemas.openxmlformats.org/drawingml/2006/main" xmlns:r="http://schemas.openxmlformats.org/officeDocument/2006/relationships" xmlns:p="http://schemas.openxmlformats.org/presentationml/2006/main">
+  <p:cSld>
+    <p:spTree>
+      <p:nvGrpSpPr>
+        <p:cNvPr id="1" name=""/>
+        <p:cNvGrpSpPr/>
+        <p:nvPr/>
+      </p:nvGrpSpPr>
+      <p:grpSpPr>
+        <a:xfrm>
+          <a:off x="0" y="0"/>
+          <a:ext cx="0" cy="0"/>
+          <a:chOff x="0" y="0"/>
+          <a:chExt cx="0" cy="0"/>
+        </a:xfrm>
+      </p:grpSpPr>
+      <p:sp>
+        <p:nvSpPr>
+          <p:cNvPr id="2" name="Title 1">
+            <a:extLst>
+              <a:ext uri="{FF2B5EF4-FFF2-40B4-BE49-F238E27FC236}">
+                <a16:creationId xmlns:a16="http://schemas.microsoft.com/office/drawing/2014/main" id="{E9C46D7A-C9FA-4B8E-A86F-45C2DEB4EDA1}"/>
+              </a:ext>
+            </a:extLst>
+          </p:cNvPr>
+          <p:cNvSpPr>
+            <a:spLocks noGrp="1"/>
+          </p:cNvSpPr>
+          <p:nvPr>
+            <p:ph type="title"/>
+          </p:nvPr>
+        </p:nvSpPr>
+        <p:spPr>
+          <a:xfrm>
+            <a:off x="581192" y="702156"/>
+            <a:ext cx="11029616" cy="564669"/>
+          </a:xfrm>
+        </p:spPr>
+        <p:txBody>
+          <a:bodyPr/>
+          <a:lstStyle/>
+          <a:p>
+            <a:r>
+              <a:rPr lang="en-US" dirty="0"/>
+              <a:t>Add Migration (Persist data in disconnected scenarios) - 1</a:t>
+            </a:r>
+          </a:p>
+        </p:txBody>
+      </p:sp>
+      <p:pic>
+        <p:nvPicPr>
+          <p:cNvPr id="4" name="Picture 3">
+            <a:extLst>
+              <a:ext uri="{FF2B5EF4-FFF2-40B4-BE49-F238E27FC236}">
+                <a16:creationId xmlns:a16="http://schemas.microsoft.com/office/drawing/2014/main" id="{EB3047E2-D08B-457E-B06A-BB8ED10C84A5}"/>
+              </a:ext>
+            </a:extLst>
+          </p:cNvPr>
+          <p:cNvPicPr>
+            <a:picLocks noChangeAspect="1"/>
+          </p:cNvPicPr>
+          <p:nvPr/>
+        </p:nvPicPr>
+        <p:blipFill>
+          <a:blip r:embed="rId2"/>
+          <a:stretch>
+            <a:fillRect/>
+          </a:stretch>
+        </p:blipFill>
+        <p:spPr>
+          <a:xfrm>
+            <a:off x="362117" y="1185032"/>
+            <a:ext cx="7029450" cy="1657350"/>
+          </a:xfrm>
+          <a:prstGeom prst="rect">
+            <a:avLst/>
+          </a:prstGeom>
+        </p:spPr>
+      </p:pic>
+      <p:pic>
+        <p:nvPicPr>
+          <p:cNvPr id="5" name="Picture 4">
+            <a:extLst>
+              <a:ext uri="{FF2B5EF4-FFF2-40B4-BE49-F238E27FC236}">
+                <a16:creationId xmlns:a16="http://schemas.microsoft.com/office/drawing/2014/main" id="{A2231B78-27B8-4118-9EFC-7E2961DAA6C0}"/>
+              </a:ext>
+            </a:extLst>
+          </p:cNvPr>
+          <p:cNvPicPr>
+            <a:picLocks noChangeAspect="1"/>
+          </p:cNvPicPr>
+          <p:nvPr/>
+        </p:nvPicPr>
+        <p:blipFill>
+          <a:blip r:embed="rId3"/>
+          <a:stretch>
+            <a:fillRect/>
+          </a:stretch>
+        </p:blipFill>
+        <p:spPr>
+          <a:xfrm>
+            <a:off x="171450" y="3019424"/>
+            <a:ext cx="11849100" cy="3533775"/>
+          </a:xfrm>
+          <a:prstGeom prst="rect">
+            <a:avLst/>
+          </a:prstGeom>
+        </p:spPr>
+      </p:pic>
+    </p:spTree>
+    <p:extLst>
+      <p:ext uri="{BB962C8B-B14F-4D97-AF65-F5344CB8AC3E}">
+        <p14:creationId xmlns:p14="http://schemas.microsoft.com/office/powerpoint/2010/main" val="286295426"/>
+      </p:ext>
+    </p:extLst>
+  </p:cSld>
+  <p:clrMapOvr>
+    <a:masterClrMapping/>
+  </p:clrMapOvr>
+</p:sld>
+</file>
+
+<file path=ppt/slides/slide26.xml><?xml version="1.0" encoding="utf-8"?>
+<p:sld xmlns:a="http://schemas.openxmlformats.org/drawingml/2006/main" xmlns:r="http://schemas.openxmlformats.org/officeDocument/2006/relationships" xmlns:p="http://schemas.openxmlformats.org/presentationml/2006/main">
+  <p:cSld>
+    <p:spTree>
+      <p:nvGrpSpPr>
+        <p:cNvPr id="1" name=""/>
+        <p:cNvGrpSpPr/>
+        <p:nvPr/>
+      </p:nvGrpSpPr>
+      <p:grpSpPr>
+        <a:xfrm>
+          <a:off x="0" y="0"/>
+          <a:ext cx="0" cy="0"/>
+          <a:chOff x="0" y="0"/>
+          <a:chExt cx="0" cy="0"/>
+        </a:xfrm>
+      </p:grpSpPr>
+      <p:sp>
+        <p:nvSpPr>
+          <p:cNvPr id="2" name="Title 1">
+            <a:extLst>
+              <a:ext uri="{FF2B5EF4-FFF2-40B4-BE49-F238E27FC236}">
+                <a16:creationId xmlns:a16="http://schemas.microsoft.com/office/drawing/2014/main" id="{E9C46D7A-C9FA-4B8E-A86F-45C2DEB4EDA1}"/>
+              </a:ext>
+            </a:extLst>
+          </p:cNvPr>
+          <p:cNvSpPr>
+            <a:spLocks noGrp="1"/>
+          </p:cNvSpPr>
+          <p:nvPr>
+            <p:ph type="title"/>
+          </p:nvPr>
+        </p:nvSpPr>
+        <p:spPr>
+          <a:xfrm>
+            <a:off x="581192" y="702156"/>
+            <a:ext cx="11029616" cy="564669"/>
+          </a:xfrm>
+        </p:spPr>
+        <p:txBody>
+          <a:bodyPr/>
+          <a:lstStyle/>
+          <a:p>
+            <a:r>
+              <a:rPr lang="en-US" dirty="0"/>
+              <a:t>Add Migration (Persist data in disconnected scenarios) - 2</a:t>
+            </a:r>
+          </a:p>
+        </p:txBody>
+      </p:sp>
+      <p:pic>
+        <p:nvPicPr>
+          <p:cNvPr id="3" name="Picture 2">
+            <a:extLst>
+              <a:ext uri="{FF2B5EF4-FFF2-40B4-BE49-F238E27FC236}">
+                <a16:creationId xmlns:a16="http://schemas.microsoft.com/office/drawing/2014/main" id="{E9DBF41C-2B16-49C9-BF42-9D2708CCB7FB}"/>
+              </a:ext>
+            </a:extLst>
+          </p:cNvPr>
+          <p:cNvPicPr>
+            <a:picLocks noChangeAspect="1"/>
+          </p:cNvPicPr>
+          <p:nvPr/>
+        </p:nvPicPr>
+        <p:blipFill>
+          <a:blip r:embed="rId2"/>
+          <a:stretch>
+            <a:fillRect/>
+          </a:stretch>
+        </p:blipFill>
+        <p:spPr>
+          <a:xfrm>
+            <a:off x="676275" y="1295400"/>
+            <a:ext cx="10839450" cy="4267200"/>
+          </a:xfrm>
+          <a:prstGeom prst="rect">
+            <a:avLst/>
+          </a:prstGeom>
+        </p:spPr>
+      </p:pic>
+      <p:sp>
+        <p:nvSpPr>
+          <p:cNvPr id="6" name="TextBox 5">
+            <a:extLst>
+              <a:ext uri="{FF2B5EF4-FFF2-40B4-BE49-F238E27FC236}">
+                <a16:creationId xmlns:a16="http://schemas.microsoft.com/office/drawing/2014/main" id="{B9DDAE7F-89FA-430D-8D94-B9AB4D67EA2E}"/>
+              </a:ext>
+            </a:extLst>
+          </p:cNvPr>
+          <p:cNvSpPr txBox="1"/>
+          <p:nvPr/>
+        </p:nvSpPr>
+        <p:spPr>
+          <a:xfrm>
+            <a:off x="520118" y="5786512"/>
+            <a:ext cx="7033144" cy="369332"/>
+          </a:xfrm>
+          <a:prstGeom prst="rect">
+            <a:avLst/>
+          </a:prstGeom>
+          <a:noFill/>
+        </p:spPr>
+        <p:txBody>
+          <a:bodyPr wrap="none" rtlCol="0">
+            <a:spAutoFit/>
+          </a:bodyPr>
+          <a:lstStyle/>
+          <a:p>
+            <a:r>
+              <a:rPr lang="en-US" dirty="0" err="1"/>
+              <a:t>DateTime</a:t>
+            </a:r>
+            <a:r>
+              <a:rPr lang="en-US" dirty="0"/>
+              <a:t> values are not nullable. So PostgreSQL added default values.</a:t>
+            </a:r>
+          </a:p>
+        </p:txBody>
+      </p:sp>
+    </p:spTree>
+    <p:extLst>
+      <p:ext uri="{BB962C8B-B14F-4D97-AF65-F5344CB8AC3E}">
+        <p14:creationId xmlns:p14="http://schemas.microsoft.com/office/powerpoint/2010/main" val="1318298664"/>
       </p:ext>
     </p:extLst>
   </p:cSld>
@@ -8386,12 +8643,12 @@
 </file>
 
 <file path=customXml/item1.xml><?xml version="1.0" encoding="utf-8"?>
-<p:properties xmlns:p="http://schemas.microsoft.com/office/2006/metadata/properties" xmlns:xsi="http://www.w3.org/2001/XMLSchema-instance" xmlns:pc="http://schemas.microsoft.com/office/infopath/2007/PartnerControls">
-  <documentManagement>
-    <Status xmlns="71af3243-3dd4-4a8d-8c0d-dd76da1f02a5">Not started</Status>
-    <MediaServiceKeyPoints xmlns="71af3243-3dd4-4a8d-8c0d-dd76da1f02a5" xsi:nil="true"/>
-  </documentManagement>
-</p:properties>
+<?mso-contentType ?>
+<FormTemplates xmlns="http://schemas.microsoft.com/sharepoint/v3/contenttype/forms">
+  <Display>DocumentLibraryForm</Display>
+  <Edit>DocumentLibraryForm</Edit>
+  <New>DocumentLibraryForm</New>
+</FormTemplates>
 </file>
 
 <file path=customXml/item2.xml><?xml version="1.0" encoding="utf-8"?>
@@ -8616,20 +8873,18 @@
 </file>
 
 <file path=customXml/item3.xml><?xml version="1.0" encoding="utf-8"?>
-<?mso-contentType ?>
-<FormTemplates xmlns="http://schemas.microsoft.com/sharepoint/v3/contenttype/forms">
-  <Display>DocumentLibraryForm</Display>
-  <Edit>DocumentLibraryForm</Edit>
-  <New>DocumentLibraryForm</New>
-</FormTemplates>
+<p:properties xmlns:p="http://schemas.microsoft.com/office/2006/metadata/properties" xmlns:xsi="http://www.w3.org/2001/XMLSchema-instance" xmlns:pc="http://schemas.microsoft.com/office/infopath/2007/PartnerControls">
+  <documentManagement>
+    <Status xmlns="71af3243-3dd4-4a8d-8c0d-dd76da1f02a5">Not started</Status>
+    <MediaServiceKeyPoints xmlns="71af3243-3dd4-4a8d-8c0d-dd76da1f02a5" xsi:nil="true"/>
+  </documentManagement>
+</p:properties>
 </file>
 
 <file path=customXml/itemProps1.xml><?xml version="1.0" encoding="utf-8"?>
-<ds:datastoreItem xmlns:ds="http://schemas.openxmlformats.org/officeDocument/2006/customXml" ds:itemID="{8D289AE2-D2AE-49D1-AFAC-3A79F6794255}">
+<ds:datastoreItem xmlns:ds="http://schemas.openxmlformats.org/officeDocument/2006/customXml" ds:itemID="{927BD4C1-B6B1-4715-ABF9-E660A51A4EA0}">
   <ds:schemaRefs>
-    <ds:schemaRef ds:uri="http://schemas.microsoft.com/office/2006/metadata/properties"/>
-    <ds:schemaRef ds:uri="http://schemas.microsoft.com/office/infopath/2007/PartnerControls"/>
-    <ds:schemaRef ds:uri="71af3243-3dd4-4a8d-8c0d-dd76da1f02a5"/>
+    <ds:schemaRef ds:uri="http://schemas.microsoft.com/sharepoint/v3/contenttype/forms"/>
   </ds:schemaRefs>
 </ds:datastoreItem>
 </file>
@@ -8654,9 +8909,11 @@
 </file>
 
 <file path=customXml/itemProps3.xml><?xml version="1.0" encoding="utf-8"?>
-<ds:datastoreItem xmlns:ds="http://schemas.openxmlformats.org/officeDocument/2006/customXml" ds:itemID="{927BD4C1-B6B1-4715-ABF9-E660A51A4EA0}">
+<ds:datastoreItem xmlns:ds="http://schemas.openxmlformats.org/officeDocument/2006/customXml" ds:itemID="{8D289AE2-D2AE-49D1-AFAC-3A79F6794255}">
   <ds:schemaRefs>
-    <ds:schemaRef ds:uri="http://schemas.microsoft.com/sharepoint/v3/contenttype/forms"/>
+    <ds:schemaRef ds:uri="http://schemas.microsoft.com/office/2006/metadata/properties"/>
+    <ds:schemaRef ds:uri="http://schemas.microsoft.com/office/infopath/2007/PartnerControls"/>
+    <ds:schemaRef ds:uri="71af3243-3dd4-4a8d-8c0d-dd76da1f02a5"/>
   </ds:schemaRefs>
 </ds:datastoreItem>
 </file>
</xml_diff>